<commit_message>
Enhance presentation with better UX design
- Added visual cards with icons
- 2-column layout for Solution slide
- 2x3 grid for Features slide
- Architecture diagram with colored boxes and connectors
- Better spacing and visual hierarchy

🤖 Generated with [Claude Code](https://claude.com/claude-code)

Co-Authored-By: Claude Opus 4.5 <noreply@anthropic.com>
</commit_message>
<xml_diff>
--- a/Djezzy_POS_Presentation.pptx
+++ b/Djezzy_POS_Presentation.pptx
@@ -3144,7 +3144,7 @@
         </p:nvSpPr>
         <p:spPr>
           <a:xfrm>
-            <a:off x="457200" y="2286000"/>
+            <a:off x="457200" y="2011680"/>
             <a:ext cx="11277295" cy="1371600"/>
           </a:xfrm>
           <a:prstGeom prst="rect">
@@ -3159,7 +3159,7 @@
           <a:lstStyle/>
           <a:p>
             <a:pPr algn="ctr">
-              <a:defRPr sz="6000" b="1">
+              <a:defRPr sz="7200" b="1">
                 <a:solidFill>
                   <a:srgbClr val="FFFFFF"/>
                 </a:solidFill>
@@ -3179,7 +3179,7 @@
         </p:nvSpPr>
         <p:spPr>
           <a:xfrm>
-            <a:off x="457200" y="3840480"/>
+            <a:off x="457200" y="3657600"/>
             <a:ext cx="11277295" cy="914400"/>
           </a:xfrm>
           <a:prstGeom prst="rect">
@@ -3203,6 +3203,49 @@
             <a:r>
               <a:t>Système de Gestion des Contrats Mobiles</a:t>
             </a:r>
+          </a:p>
+        </p:txBody>
+      </p:sp>
+      <p:sp>
+        <p:nvSpPr>
+          <p:cNvPr id="5" name="Rectangle 4"/>
+          <p:cNvSpPr/>
+          <p:nvPr/>
+        </p:nvSpPr>
+        <p:spPr>
+          <a:xfrm>
+            <a:off x="4572000" y="3474720"/>
+            <a:ext cx="3047695" cy="45720"/>
+          </a:xfrm>
+          <a:prstGeom prst="rect">
+            <a:avLst/>
+          </a:prstGeom>
+          <a:solidFill>
+            <a:srgbClr val="FFFFFF"/>
+          </a:solidFill>
+          <a:ln>
+            <a:noFill/>
+          </a:ln>
+        </p:spPr>
+        <p:style>
+          <a:lnRef idx="1">
+            <a:schemeClr val="accent1"/>
+          </a:lnRef>
+          <a:fillRef idx="3">
+            <a:schemeClr val="accent1"/>
+          </a:fillRef>
+          <a:effectRef idx="2">
+            <a:schemeClr val="accent1"/>
+          </a:effectRef>
+          <a:fontRef idx="minor">
+            <a:schemeClr val="lt1"/>
+          </a:fontRef>
+        </p:style>
+        <p:txBody>
+          <a:bodyPr rtlCol="0" anchor="ctr"/>
+          <a:lstStyle/>
+          <a:p>
+            <a:pPr algn="ctr"/>
           </a:p>
         </p:txBody>
       </p:sp>
@@ -3233,7 +3276,7 @@
         <p:spPr>
           <a:xfrm>
             <a:off x="0" y="0"/>
-            <a:ext cx="12191695" cy="1371600"/>
+            <a:ext cx="12191695" cy="1188720"/>
           </a:xfrm>
           <a:prstGeom prst="rect">
             <a:avLst/>
@@ -3275,7 +3318,7 @@
         </p:nvSpPr>
         <p:spPr>
           <a:xfrm>
-            <a:off x="457200" y="365760"/>
+            <a:off x="457200" y="320040"/>
             <a:ext cx="11277295" cy="731520"/>
           </a:xfrm>
           <a:prstGeom prst="rect">
@@ -3297,21 +3340,95 @@
               </a:defRPr>
             </a:pPr>
             <a:r>
-              <a:t>Problématique</a:t>
-            </a:r>
-          </a:p>
-        </p:txBody>
-      </p:sp>
-      <p:sp>
-        <p:nvSpPr>
-          <p:cNvPr id="4" name="TextBox 3"/>
+              <a:t>⚠️  Problématique</a:t>
+            </a:r>
+          </a:p>
+        </p:txBody>
+      </p:sp>
+      <p:sp>
+        <p:nvSpPr>
+          <p:cNvPr id="4" name="Rounded Rectangle 3"/>
+          <p:cNvSpPr/>
+          <p:nvPr/>
+        </p:nvSpPr>
+        <p:spPr>
+          <a:xfrm>
+            <a:off x="731520" y="1645920"/>
+            <a:ext cx="3474720" cy="2011680"/>
+          </a:xfrm>
+          <a:prstGeom prst="roundRect">
+            <a:avLst/>
+          </a:prstGeom>
+          <a:solidFill>
+            <a:srgbClr val="F5F5F5"/>
+          </a:solidFill>
+          <a:ln>
+            <a:noFill/>
+          </a:ln>
+        </p:spPr>
+        <p:style>
+          <a:lnRef idx="1">
+            <a:schemeClr val="accent1"/>
+          </a:lnRef>
+          <a:fillRef idx="3">
+            <a:schemeClr val="accent1"/>
+          </a:fillRef>
+          <a:effectRef idx="2">
+            <a:schemeClr val="accent1"/>
+          </a:effectRef>
+          <a:fontRef idx="minor">
+            <a:schemeClr val="lt1"/>
+          </a:fontRef>
+        </p:style>
+        <p:txBody>
+          <a:bodyPr rtlCol="0" anchor="ctr"/>
+          <a:lstStyle/>
+          <a:p>
+            <a:pPr algn="ctr"/>
+          </a:p>
+        </p:txBody>
+      </p:sp>
+      <p:sp>
+        <p:nvSpPr>
+          <p:cNvPr id="5" name="TextBox 4"/>
           <p:cNvSpPr txBox="1"/>
           <p:nvPr/>
         </p:nvSpPr>
         <p:spPr>
           <a:xfrm>
-            <a:off x="731520" y="1828800"/>
-            <a:ext cx="10728655" cy="4572000"/>
+            <a:off x="731520" y="1920240"/>
+            <a:ext cx="3474720" cy="548640"/>
+          </a:xfrm>
+          <a:prstGeom prst="rect">
+            <a:avLst/>
+          </a:prstGeom>
+          <a:noFill/>
+        </p:spPr>
+        <p:txBody>
+          <a:bodyPr wrap="none">
+            <a:spAutoFit/>
+          </a:bodyPr>
+          <a:lstStyle/>
+          <a:p>
+            <a:pPr algn="ctr">
+              <a:defRPr sz="3200"/>
+            </a:pPr>
+            <a:r>
+              <a:t>⏱️</a:t>
+            </a:r>
+          </a:p>
+        </p:txBody>
+      </p:sp>
+      <p:sp>
+        <p:nvSpPr>
+          <p:cNvPr id="6" name="TextBox 5"/>
+          <p:cNvSpPr txBox="1"/>
+          <p:nvPr/>
+        </p:nvSpPr>
+        <p:spPr>
+          <a:xfrm>
+            <a:off x="822960" y="2468880"/>
+            <a:ext cx="3291840" cy="731520"/>
           </a:xfrm>
           <a:prstGeom prst="rect">
             <a:avLst/>
@@ -3324,78 +3441,471 @@
           </a:bodyPr>
           <a:lstStyle/>
           <a:p>
-            <a:pPr>
-              <a:spcAft>
-                <a:spcPts val="1800"/>
-              </a:spcAft>
-              <a:defRPr sz="2400">
+            <a:pPr algn="ctr">
+              <a:defRPr sz="1400">
                 <a:solidFill>
                   <a:srgbClr val="333333"/>
                 </a:solidFill>
               </a:defRPr>
             </a:pPr>
             <a:r>
-              <a:t>• Processus de souscription manuel et lent</a:t>
-            </a:r>
-          </a:p>
-          <a:p>
-            <a:pPr>
-              <a:spcAft>
-                <a:spcPts val="1800"/>
-              </a:spcAft>
-              <a:defRPr sz="2400">
+              <a:t>Processus lent</a:t>
+            </a:r>
+            <a:br/>
+            <a:r>
+              <a:t>Souscription manuelle</a:t>
+            </a:r>
+          </a:p>
+        </p:txBody>
+      </p:sp>
+      <p:sp>
+        <p:nvSpPr>
+          <p:cNvPr id="7" name="Rounded Rectangle 6"/>
+          <p:cNvSpPr/>
+          <p:nvPr/>
+        </p:nvSpPr>
+        <p:spPr>
+          <a:xfrm>
+            <a:off x="4572000" y="1645920"/>
+            <a:ext cx="3474720" cy="2011680"/>
+          </a:xfrm>
+          <a:prstGeom prst="roundRect">
+            <a:avLst/>
+          </a:prstGeom>
+          <a:solidFill>
+            <a:srgbClr val="F5F5F5"/>
+          </a:solidFill>
+          <a:ln>
+            <a:noFill/>
+          </a:ln>
+        </p:spPr>
+        <p:style>
+          <a:lnRef idx="1">
+            <a:schemeClr val="accent1"/>
+          </a:lnRef>
+          <a:fillRef idx="3">
+            <a:schemeClr val="accent1"/>
+          </a:fillRef>
+          <a:effectRef idx="2">
+            <a:schemeClr val="accent1"/>
+          </a:effectRef>
+          <a:fontRef idx="minor">
+            <a:schemeClr val="lt1"/>
+          </a:fontRef>
+        </p:style>
+        <p:txBody>
+          <a:bodyPr rtlCol="0" anchor="ctr"/>
+          <a:lstStyle/>
+          <a:p>
+            <a:pPr algn="ctr"/>
+          </a:p>
+        </p:txBody>
+      </p:sp>
+      <p:sp>
+        <p:nvSpPr>
+          <p:cNvPr id="8" name="TextBox 7"/>
+          <p:cNvSpPr txBox="1"/>
+          <p:nvPr/>
+        </p:nvSpPr>
+        <p:spPr>
+          <a:xfrm>
+            <a:off x="4572000" y="1920240"/>
+            <a:ext cx="3474720" cy="548640"/>
+          </a:xfrm>
+          <a:prstGeom prst="rect">
+            <a:avLst/>
+          </a:prstGeom>
+          <a:noFill/>
+        </p:spPr>
+        <p:txBody>
+          <a:bodyPr wrap="none">
+            <a:spAutoFit/>
+          </a:bodyPr>
+          <a:lstStyle/>
+          <a:p>
+            <a:pPr algn="ctr">
+              <a:defRPr sz="3200"/>
+            </a:pPr>
+            <a:r>
+              <a:t>📋</a:t>
+            </a:r>
+          </a:p>
+        </p:txBody>
+      </p:sp>
+      <p:sp>
+        <p:nvSpPr>
+          <p:cNvPr id="9" name="TextBox 8"/>
+          <p:cNvSpPr txBox="1"/>
+          <p:nvPr/>
+        </p:nvSpPr>
+        <p:spPr>
+          <a:xfrm>
+            <a:off x="4663440" y="2468880"/>
+            <a:ext cx="3291840" cy="731520"/>
+          </a:xfrm>
+          <a:prstGeom prst="rect">
+            <a:avLst/>
+          </a:prstGeom>
+          <a:noFill/>
+        </p:spPr>
+        <p:txBody>
+          <a:bodyPr wrap="square">
+            <a:spAutoFit/>
+          </a:bodyPr>
+          <a:lstStyle/>
+          <a:p>
+            <a:pPr algn="ctr">
+              <a:defRPr sz="1400">
                 <a:solidFill>
                   <a:srgbClr val="333333"/>
                 </a:solidFill>
               </a:defRPr>
             </a:pPr>
             <a:r>
-              <a:t>• Vérification d'identité sur papier (photocopies CNI)</a:t>
-            </a:r>
-          </a:p>
-          <a:p>
-            <a:pPr>
-              <a:spcAft>
-                <a:spcPts val="1800"/>
-              </a:spcAft>
-              <a:defRPr sz="2400">
+              <a:t>Papier</a:t>
+            </a:r>
+            <a:br/>
+            <a:r>
+              <a:t>Photocopies CNI</a:t>
+            </a:r>
+          </a:p>
+        </p:txBody>
+      </p:sp>
+      <p:sp>
+        <p:nvSpPr>
+          <p:cNvPr id="10" name="Rounded Rectangle 9"/>
+          <p:cNvSpPr/>
+          <p:nvPr/>
+        </p:nvSpPr>
+        <p:spPr>
+          <a:xfrm>
+            <a:off x="8412480" y="1645920"/>
+            <a:ext cx="3474720" cy="2011680"/>
+          </a:xfrm>
+          <a:prstGeom prst="roundRect">
+            <a:avLst/>
+          </a:prstGeom>
+          <a:solidFill>
+            <a:srgbClr val="F5F5F5"/>
+          </a:solidFill>
+          <a:ln>
+            <a:noFill/>
+          </a:ln>
+        </p:spPr>
+        <p:style>
+          <a:lnRef idx="1">
+            <a:schemeClr val="accent1"/>
+          </a:lnRef>
+          <a:fillRef idx="3">
+            <a:schemeClr val="accent1"/>
+          </a:fillRef>
+          <a:effectRef idx="2">
+            <a:schemeClr val="accent1"/>
+          </a:effectRef>
+          <a:fontRef idx="minor">
+            <a:schemeClr val="lt1"/>
+          </a:fontRef>
+        </p:style>
+        <p:txBody>
+          <a:bodyPr rtlCol="0" anchor="ctr"/>
+          <a:lstStyle/>
+          <a:p>
+            <a:pPr algn="ctr"/>
+          </a:p>
+        </p:txBody>
+      </p:sp>
+      <p:sp>
+        <p:nvSpPr>
+          <p:cNvPr id="11" name="TextBox 10"/>
+          <p:cNvSpPr txBox="1"/>
+          <p:nvPr/>
+        </p:nvSpPr>
+        <p:spPr>
+          <a:xfrm>
+            <a:off x="8412480" y="1920240"/>
+            <a:ext cx="3474720" cy="548640"/>
+          </a:xfrm>
+          <a:prstGeom prst="rect">
+            <a:avLst/>
+          </a:prstGeom>
+          <a:noFill/>
+        </p:spPr>
+        <p:txBody>
+          <a:bodyPr wrap="none">
+            <a:spAutoFit/>
+          </a:bodyPr>
+          <a:lstStyle/>
+          <a:p>
+            <a:pPr algn="ctr">
+              <a:defRPr sz="3200"/>
+            </a:pPr>
+            <a:r>
+              <a:t>❓</a:t>
+            </a:r>
+          </a:p>
+        </p:txBody>
+      </p:sp>
+      <p:sp>
+        <p:nvSpPr>
+          <p:cNvPr id="12" name="TextBox 11"/>
+          <p:cNvSpPr txBox="1"/>
+          <p:nvPr/>
+        </p:nvSpPr>
+        <p:spPr>
+          <a:xfrm>
+            <a:off x="8503920" y="2468880"/>
+            <a:ext cx="3291840" cy="731520"/>
+          </a:xfrm>
+          <a:prstGeom prst="rect">
+            <a:avLst/>
+          </a:prstGeom>
+          <a:noFill/>
+        </p:spPr>
+        <p:txBody>
+          <a:bodyPr wrap="square">
+            <a:spAutoFit/>
+          </a:bodyPr>
+          <a:lstStyle/>
+          <a:p>
+            <a:pPr algn="ctr">
+              <a:defRPr sz="1400">
                 <a:solidFill>
                   <a:srgbClr val="333333"/>
                 </a:solidFill>
               </a:defRPr>
             </a:pPr>
             <a:r>
-              <a:t>• Pas de suivi en temps réel des numéros disponibles</a:t>
-            </a:r>
-          </a:p>
-          <a:p>
-            <a:pPr>
-              <a:spcAft>
-                <a:spcPts val="1800"/>
-              </a:spcAft>
-              <a:defRPr sz="2400">
+              <a:t>Pas de visibilité</a:t>
+            </a:r>
+            <a:br/>
+            <a:r>
+              <a:t>Stock numéros</a:t>
+            </a:r>
+          </a:p>
+        </p:txBody>
+      </p:sp>
+      <p:sp>
+        <p:nvSpPr>
+          <p:cNvPr id="13" name="Rounded Rectangle 12"/>
+          <p:cNvSpPr/>
+          <p:nvPr/>
+        </p:nvSpPr>
+        <p:spPr>
+          <a:xfrm>
+            <a:off x="2651760" y="3931920"/>
+            <a:ext cx="3474720" cy="2011680"/>
+          </a:xfrm>
+          <a:prstGeom prst="roundRect">
+            <a:avLst/>
+          </a:prstGeom>
+          <a:solidFill>
+            <a:srgbClr val="F5F5F5"/>
+          </a:solidFill>
+          <a:ln>
+            <a:noFill/>
+          </a:ln>
+        </p:spPr>
+        <p:style>
+          <a:lnRef idx="1">
+            <a:schemeClr val="accent1"/>
+          </a:lnRef>
+          <a:fillRef idx="3">
+            <a:schemeClr val="accent1"/>
+          </a:fillRef>
+          <a:effectRef idx="2">
+            <a:schemeClr val="accent1"/>
+          </a:effectRef>
+          <a:fontRef idx="minor">
+            <a:schemeClr val="lt1"/>
+          </a:fontRef>
+        </p:style>
+        <p:txBody>
+          <a:bodyPr rtlCol="0" anchor="ctr"/>
+          <a:lstStyle/>
+          <a:p>
+            <a:pPr algn="ctr"/>
+          </a:p>
+        </p:txBody>
+      </p:sp>
+      <p:sp>
+        <p:nvSpPr>
+          <p:cNvPr id="14" name="TextBox 13"/>
+          <p:cNvSpPr txBox="1"/>
+          <p:nvPr/>
+        </p:nvSpPr>
+        <p:spPr>
+          <a:xfrm>
+            <a:off x="2651760" y="4206240"/>
+            <a:ext cx="3474720" cy="548640"/>
+          </a:xfrm>
+          <a:prstGeom prst="rect">
+            <a:avLst/>
+          </a:prstGeom>
+          <a:noFill/>
+        </p:spPr>
+        <p:txBody>
+          <a:bodyPr wrap="none">
+            <a:spAutoFit/>
+          </a:bodyPr>
+          <a:lstStyle/>
+          <a:p>
+            <a:pPr algn="ctr">
+              <a:defRPr sz="3200"/>
+            </a:pPr>
+            <a:r>
+              <a:t>📝</a:t>
+            </a:r>
+          </a:p>
+        </p:txBody>
+      </p:sp>
+      <p:sp>
+        <p:nvSpPr>
+          <p:cNvPr id="15" name="TextBox 14"/>
+          <p:cNvSpPr txBox="1"/>
+          <p:nvPr/>
+        </p:nvSpPr>
+        <p:spPr>
+          <a:xfrm>
+            <a:off x="2743200" y="4754880"/>
+            <a:ext cx="3291840" cy="731520"/>
+          </a:xfrm>
+          <a:prstGeom prst="rect">
+            <a:avLst/>
+          </a:prstGeom>
+          <a:noFill/>
+        </p:spPr>
+        <p:txBody>
+          <a:bodyPr wrap="square">
+            <a:spAutoFit/>
+          </a:bodyPr>
+          <a:lstStyle/>
+          <a:p>
+            <a:pPr algn="ctr">
+              <a:defRPr sz="1400">
                 <a:solidFill>
                   <a:srgbClr val="333333"/>
                 </a:solidFill>
               </a:defRPr>
             </a:pPr>
             <a:r>
-              <a:t>• Génération manuelle des contrats</a:t>
-            </a:r>
-          </a:p>
-          <a:p>
-            <a:pPr>
-              <a:spcAft>
-                <a:spcPts val="1800"/>
-              </a:spcAft>
-              <a:defRPr sz="2400">
+              <a:t>Contrats manuels</a:t>
+            </a:r>
+            <a:br/>
+            <a:r>
+              <a:t>Risque d'erreurs</a:t>
+            </a:r>
+          </a:p>
+        </p:txBody>
+      </p:sp>
+      <p:sp>
+        <p:nvSpPr>
+          <p:cNvPr id="16" name="Rounded Rectangle 15"/>
+          <p:cNvSpPr/>
+          <p:nvPr/>
+        </p:nvSpPr>
+        <p:spPr>
+          <a:xfrm>
+            <a:off x="6492240" y="3931920"/>
+            <a:ext cx="3474720" cy="2011680"/>
+          </a:xfrm>
+          <a:prstGeom prst="roundRect">
+            <a:avLst/>
+          </a:prstGeom>
+          <a:solidFill>
+            <a:srgbClr val="F5F5F5"/>
+          </a:solidFill>
+          <a:ln>
+            <a:noFill/>
+          </a:ln>
+        </p:spPr>
+        <p:style>
+          <a:lnRef idx="1">
+            <a:schemeClr val="accent1"/>
+          </a:lnRef>
+          <a:fillRef idx="3">
+            <a:schemeClr val="accent1"/>
+          </a:fillRef>
+          <a:effectRef idx="2">
+            <a:schemeClr val="accent1"/>
+          </a:effectRef>
+          <a:fontRef idx="minor">
+            <a:schemeClr val="lt1"/>
+          </a:fontRef>
+        </p:style>
+        <p:txBody>
+          <a:bodyPr rtlCol="0" anchor="ctr"/>
+          <a:lstStyle/>
+          <a:p>
+            <a:pPr algn="ctr"/>
+          </a:p>
+        </p:txBody>
+      </p:sp>
+      <p:sp>
+        <p:nvSpPr>
+          <p:cNvPr id="17" name="TextBox 16"/>
+          <p:cNvSpPr txBox="1"/>
+          <p:nvPr/>
+        </p:nvSpPr>
+        <p:spPr>
+          <a:xfrm>
+            <a:off x="6492240" y="4206240"/>
+            <a:ext cx="3474720" cy="548640"/>
+          </a:xfrm>
+          <a:prstGeom prst="rect">
+            <a:avLst/>
+          </a:prstGeom>
+          <a:noFill/>
+        </p:spPr>
+        <p:txBody>
+          <a:bodyPr wrap="none">
+            <a:spAutoFit/>
+          </a:bodyPr>
+          <a:lstStyle/>
+          <a:p>
+            <a:pPr algn="ctr">
+              <a:defRPr sz="3200"/>
+            </a:pPr>
+            <a:r>
+              <a:t>📉</a:t>
+            </a:r>
+          </a:p>
+        </p:txBody>
+      </p:sp>
+      <p:sp>
+        <p:nvSpPr>
+          <p:cNvPr id="18" name="TextBox 17"/>
+          <p:cNvSpPr txBox="1"/>
+          <p:nvPr/>
+        </p:nvSpPr>
+        <p:spPr>
+          <a:xfrm>
+            <a:off x="6583680" y="4754880"/>
+            <a:ext cx="3291840" cy="731520"/>
+          </a:xfrm>
+          <a:prstGeom prst="rect">
+            <a:avLst/>
+          </a:prstGeom>
+          <a:noFill/>
+        </p:spPr>
+        <p:txBody>
+          <a:bodyPr wrap="square">
+            <a:spAutoFit/>
+          </a:bodyPr>
+          <a:lstStyle/>
+          <a:p>
+            <a:pPr algn="ctr">
+              <a:defRPr sz="1400">
                 <a:solidFill>
                   <a:srgbClr val="333333"/>
                 </a:solidFill>
               </a:defRPr>
             </a:pPr>
             <a:r>
-              <a:t>• Difficile de suivre les performances des agents</a:t>
+              <a:t>Suivi difficile</a:t>
+            </a:r>
+            <a:br/>
+            <a:r>
+              <a:t>Performance agents</a:t>
             </a:r>
           </a:p>
         </p:txBody>
@@ -3427,7 +3937,7 @@
         <p:spPr>
           <a:xfrm>
             <a:off x="0" y="0"/>
-            <a:ext cx="12191695" cy="1371600"/>
+            <a:ext cx="12191695" cy="1188720"/>
           </a:xfrm>
           <a:prstGeom prst="rect">
             <a:avLst/>
@@ -3469,7 +3979,7 @@
         </p:nvSpPr>
         <p:spPr>
           <a:xfrm>
-            <a:off x="457200" y="365760"/>
+            <a:off x="457200" y="320040"/>
             <a:ext cx="11277295" cy="731520"/>
           </a:xfrm>
           <a:prstGeom prst="rect">
@@ -3491,21 +4001,64 @@
               </a:defRPr>
             </a:pPr>
             <a:r>
-              <a:t>Notre Solution</a:t>
-            </a:r>
-          </a:p>
-        </p:txBody>
-      </p:sp>
-      <p:sp>
-        <p:nvSpPr>
-          <p:cNvPr id="4" name="TextBox 3"/>
+              <a:t>✅  Notre Solution</a:t>
+            </a:r>
+          </a:p>
+        </p:txBody>
+      </p:sp>
+      <p:sp>
+        <p:nvSpPr>
+          <p:cNvPr id="4" name="Rounded Rectangle 3"/>
+          <p:cNvSpPr/>
+          <p:nvPr/>
+        </p:nvSpPr>
+        <p:spPr>
+          <a:xfrm>
+            <a:off x="457200" y="1554480"/>
+            <a:ext cx="5486400" cy="4846320"/>
+          </a:xfrm>
+          <a:prstGeom prst="roundRect">
+            <a:avLst/>
+          </a:prstGeom>
+          <a:solidFill>
+            <a:srgbClr val="F5F5F5"/>
+          </a:solidFill>
+          <a:ln>
+            <a:noFill/>
+          </a:ln>
+        </p:spPr>
+        <p:style>
+          <a:lnRef idx="1">
+            <a:schemeClr val="accent1"/>
+          </a:lnRef>
+          <a:fillRef idx="3">
+            <a:schemeClr val="accent1"/>
+          </a:fillRef>
+          <a:effectRef idx="2">
+            <a:schemeClr val="accent1"/>
+          </a:effectRef>
+          <a:fontRef idx="minor">
+            <a:schemeClr val="lt1"/>
+          </a:fontRef>
+        </p:style>
+        <p:txBody>
+          <a:bodyPr rtlCol="0" anchor="ctr"/>
+          <a:lstStyle/>
+          <a:p>
+            <a:pPr algn="ctr"/>
+          </a:p>
+        </p:txBody>
+      </p:sp>
+      <p:sp>
+        <p:nvSpPr>
+          <p:cNvPr id="5" name="TextBox 4"/>
           <p:cNvSpPr txBox="1"/>
           <p:nvPr/>
         </p:nvSpPr>
         <p:spPr>
           <a:xfrm>
-            <a:off x="731520" y="1828800"/>
-            <a:ext cx="10728655" cy="4572000"/>
+            <a:off x="457200" y="1737360"/>
+            <a:ext cx="5486400" cy="731520"/>
           </a:xfrm>
           <a:prstGeom prst="rect">
             <a:avLst/>
@@ -3513,83 +4066,426 @@
           <a:noFill/>
         </p:spPr>
         <p:txBody>
-          <a:bodyPr wrap="square">
+          <a:bodyPr wrap="none">
             <a:spAutoFit/>
           </a:bodyPr>
           <a:lstStyle/>
           <a:p>
+            <a:pPr algn="ctr">
+              <a:defRPr sz="4800"/>
+            </a:pPr>
+            <a:r>
+              <a:t>🖥️</a:t>
+            </a:r>
+          </a:p>
+        </p:txBody>
+      </p:sp>
+      <p:sp>
+        <p:nvSpPr>
+          <p:cNvPr id="6" name="TextBox 5"/>
+          <p:cNvSpPr txBox="1"/>
+          <p:nvPr/>
+        </p:nvSpPr>
+        <p:spPr>
+          <a:xfrm>
+            <a:off x="457200" y="2468880"/>
+            <a:ext cx="5486400" cy="548640"/>
+          </a:xfrm>
+          <a:prstGeom prst="rect">
+            <a:avLst/>
+          </a:prstGeom>
+          <a:noFill/>
+        </p:spPr>
+        <p:txBody>
+          <a:bodyPr wrap="none">
+            <a:spAutoFit/>
+          </a:bodyPr>
+          <a:lstStyle/>
+          <a:p>
+            <a:pPr algn="ctr">
+              <a:defRPr sz="2400" b="1">
+                <a:solidFill>
+                  <a:srgbClr val="E30613"/>
+                </a:solidFill>
+              </a:defRPr>
+            </a:pPr>
+            <a:r>
+              <a:t>Dashboard Web</a:t>
+            </a:r>
+          </a:p>
+        </p:txBody>
+      </p:sp>
+      <p:sp>
+        <p:nvSpPr>
+          <p:cNvPr id="7" name="TextBox 6"/>
+          <p:cNvSpPr txBox="1"/>
+          <p:nvPr/>
+        </p:nvSpPr>
+        <p:spPr>
+          <a:xfrm>
+            <a:off x="457200" y="2926080"/>
+            <a:ext cx="5486400" cy="365760"/>
+          </a:xfrm>
+          <a:prstGeom prst="rect">
+            <a:avLst/>
+          </a:prstGeom>
+          <a:noFill/>
+        </p:spPr>
+        <p:txBody>
+          <a:bodyPr wrap="none">
+            <a:spAutoFit/>
+          </a:bodyPr>
+          <a:lstStyle/>
+          <a:p>
+            <a:pPr algn="ctr">
+              <a:defRPr sz="1600">
+                <a:solidFill>
+                  <a:srgbClr val="808080"/>
+                </a:solidFill>
+              </a:defRPr>
+            </a:pPr>
+            <a:r>
+              <a:t>Pour Administrateurs</a:t>
+            </a:r>
+          </a:p>
+        </p:txBody>
+      </p:sp>
+      <p:sp>
+        <p:nvSpPr>
+          <p:cNvPr id="8" name="TextBox 7"/>
+          <p:cNvSpPr txBox="1"/>
+          <p:nvPr/>
+        </p:nvSpPr>
+        <p:spPr>
+          <a:xfrm>
+            <a:off x="731520" y="3474720"/>
+            <a:ext cx="4937760" cy="2743200"/>
+          </a:xfrm>
+          <a:prstGeom prst="rect">
+            <a:avLst/>
+          </a:prstGeom>
+          <a:noFill/>
+        </p:spPr>
+        <p:txBody>
+          <a:bodyPr wrap="none">
+            <a:spAutoFit/>
+          </a:bodyPr>
+          <a:lstStyle/>
+          <a:p>
             <a:pPr>
               <a:spcAft>
-                <a:spcPts val="1800"/>
+                <a:spcPts val="1200"/>
               </a:spcAft>
-              <a:defRPr sz="2400">
+              <a:defRPr sz="1800">
                 <a:solidFill>
                   <a:srgbClr val="333333"/>
                 </a:solidFill>
               </a:defRPr>
             </a:pPr>
             <a:r>
-              <a:t>• Dashboard web pour les administrateurs</a:t>
+              <a:t>• Gestion des offres</a:t>
             </a:r>
           </a:p>
           <a:p>
             <a:pPr>
               <a:spcAft>
-                <a:spcPts val="1800"/>
+                <a:spcPts val="1200"/>
               </a:spcAft>
-              <a:defRPr sz="2400">
+              <a:defRPr sz="1800">
                 <a:solidFill>
                   <a:srgbClr val="333333"/>
                 </a:solidFill>
               </a:defRPr>
             </a:pPr>
             <a:r>
-              <a:t>• Application mobile pour les agents terrain</a:t>
+              <a:t>• Gestion des numéros</a:t>
             </a:r>
           </a:p>
           <a:p>
             <a:pPr>
               <a:spcAft>
-                <a:spcPts val="1800"/>
+                <a:spcPts val="1200"/>
               </a:spcAft>
-              <a:defRPr sz="2400">
+              <a:defRPr sz="1800">
                 <a:solidFill>
                   <a:srgbClr val="333333"/>
                 </a:solidFill>
               </a:defRPr>
             </a:pPr>
             <a:r>
-              <a:t>• Scan automatique de la CNI (MRZ + puce NFC)</a:t>
+              <a:t>• Gestion des utilisateurs</a:t>
             </a:r>
           </a:p>
           <a:p>
             <a:pPr>
               <a:spcAft>
-                <a:spcPts val="1800"/>
+                <a:spcPts val="1200"/>
               </a:spcAft>
-              <a:defRPr sz="2400">
+              <a:defRPr sz="1800">
                 <a:solidFill>
                   <a:srgbClr val="333333"/>
                 </a:solidFill>
               </a:defRPr>
             </a:pPr>
             <a:r>
-              <a:t>• Contrats numériques avec signature électronique</a:t>
+              <a:t>• Statistiques globales</a:t>
             </a:r>
           </a:p>
           <a:p>
             <a:pPr>
               <a:spcAft>
-                <a:spcPts val="1800"/>
+                <a:spcPts val="1200"/>
               </a:spcAft>
-              <a:defRPr sz="2400">
+              <a:defRPr sz="1800">
                 <a:solidFill>
                   <a:srgbClr val="333333"/>
                 </a:solidFill>
               </a:defRPr>
             </a:pPr>
             <a:r>
-              <a:t>• Génération automatique de PDF</a:t>
+              <a:t>• Rapports de ventes</a:t>
+            </a:r>
+          </a:p>
+        </p:txBody>
+      </p:sp>
+      <p:sp>
+        <p:nvSpPr>
+          <p:cNvPr id="9" name="Rounded Rectangle 8"/>
+          <p:cNvSpPr/>
+          <p:nvPr/>
+        </p:nvSpPr>
+        <p:spPr>
+          <a:xfrm>
+            <a:off x="6248095" y="1554480"/>
+            <a:ext cx="5486400" cy="4846320"/>
+          </a:xfrm>
+          <a:prstGeom prst="roundRect">
+            <a:avLst/>
+          </a:prstGeom>
+          <a:solidFill>
+            <a:srgbClr val="F5F5F5"/>
+          </a:solidFill>
+          <a:ln>
+            <a:noFill/>
+          </a:ln>
+        </p:spPr>
+        <p:style>
+          <a:lnRef idx="1">
+            <a:schemeClr val="accent1"/>
+          </a:lnRef>
+          <a:fillRef idx="3">
+            <a:schemeClr val="accent1"/>
+          </a:fillRef>
+          <a:effectRef idx="2">
+            <a:schemeClr val="accent1"/>
+          </a:effectRef>
+          <a:fontRef idx="minor">
+            <a:schemeClr val="lt1"/>
+          </a:fontRef>
+        </p:style>
+        <p:txBody>
+          <a:bodyPr rtlCol="0" anchor="ctr"/>
+          <a:lstStyle/>
+          <a:p>
+            <a:pPr algn="ctr"/>
+          </a:p>
+        </p:txBody>
+      </p:sp>
+      <p:sp>
+        <p:nvSpPr>
+          <p:cNvPr id="10" name="TextBox 9"/>
+          <p:cNvSpPr txBox="1"/>
+          <p:nvPr/>
+        </p:nvSpPr>
+        <p:spPr>
+          <a:xfrm>
+            <a:off x="6248095" y="1737360"/>
+            <a:ext cx="5486400" cy="731520"/>
+          </a:xfrm>
+          <a:prstGeom prst="rect">
+            <a:avLst/>
+          </a:prstGeom>
+          <a:noFill/>
+        </p:spPr>
+        <p:txBody>
+          <a:bodyPr wrap="none">
+            <a:spAutoFit/>
+          </a:bodyPr>
+          <a:lstStyle/>
+          <a:p>
+            <a:pPr algn="ctr">
+              <a:defRPr sz="4800"/>
+            </a:pPr>
+            <a:r>
+              <a:t>📱</a:t>
+            </a:r>
+          </a:p>
+        </p:txBody>
+      </p:sp>
+      <p:sp>
+        <p:nvSpPr>
+          <p:cNvPr id="11" name="TextBox 10"/>
+          <p:cNvSpPr txBox="1"/>
+          <p:nvPr/>
+        </p:nvSpPr>
+        <p:spPr>
+          <a:xfrm>
+            <a:off x="6248095" y="2468880"/>
+            <a:ext cx="5486400" cy="548640"/>
+          </a:xfrm>
+          <a:prstGeom prst="rect">
+            <a:avLst/>
+          </a:prstGeom>
+          <a:noFill/>
+        </p:spPr>
+        <p:txBody>
+          <a:bodyPr wrap="none">
+            <a:spAutoFit/>
+          </a:bodyPr>
+          <a:lstStyle/>
+          <a:p>
+            <a:pPr algn="ctr">
+              <a:defRPr sz="2400" b="1">
+                <a:solidFill>
+                  <a:srgbClr val="E30613"/>
+                </a:solidFill>
+              </a:defRPr>
+            </a:pPr>
+            <a:r>
+              <a:t>Application Mobile</a:t>
+            </a:r>
+          </a:p>
+        </p:txBody>
+      </p:sp>
+      <p:sp>
+        <p:nvSpPr>
+          <p:cNvPr id="12" name="TextBox 11"/>
+          <p:cNvSpPr txBox="1"/>
+          <p:nvPr/>
+        </p:nvSpPr>
+        <p:spPr>
+          <a:xfrm>
+            <a:off x="6248095" y="2926080"/>
+            <a:ext cx="5486400" cy="365760"/>
+          </a:xfrm>
+          <a:prstGeom prst="rect">
+            <a:avLst/>
+          </a:prstGeom>
+          <a:noFill/>
+        </p:spPr>
+        <p:txBody>
+          <a:bodyPr wrap="none">
+            <a:spAutoFit/>
+          </a:bodyPr>
+          <a:lstStyle/>
+          <a:p>
+            <a:pPr algn="ctr">
+              <a:defRPr sz="1600">
+                <a:solidFill>
+                  <a:srgbClr val="808080"/>
+                </a:solidFill>
+              </a:defRPr>
+            </a:pPr>
+            <a:r>
+              <a:t>Pour Agents Terrain</a:t>
+            </a:r>
+          </a:p>
+        </p:txBody>
+      </p:sp>
+      <p:sp>
+        <p:nvSpPr>
+          <p:cNvPr id="13" name="TextBox 12"/>
+          <p:cNvSpPr txBox="1"/>
+          <p:nvPr/>
+        </p:nvSpPr>
+        <p:spPr>
+          <a:xfrm>
+            <a:off x="6522415" y="3474720"/>
+            <a:ext cx="4937760" cy="2743200"/>
+          </a:xfrm>
+          <a:prstGeom prst="rect">
+            <a:avLst/>
+          </a:prstGeom>
+          <a:noFill/>
+        </p:spPr>
+        <p:txBody>
+          <a:bodyPr wrap="none">
+            <a:spAutoFit/>
+          </a:bodyPr>
+          <a:lstStyle/>
+          <a:p>
+            <a:pPr>
+              <a:spcAft>
+                <a:spcPts val="1200"/>
+              </a:spcAft>
+              <a:defRPr sz="1800">
+                <a:solidFill>
+                  <a:srgbClr val="333333"/>
+                </a:solidFill>
+              </a:defRPr>
+            </a:pPr>
+            <a:r>
+              <a:t>• Scan CNI (MRZ + NFC)</a:t>
+            </a:r>
+          </a:p>
+          <a:p>
+            <a:pPr>
+              <a:spcAft>
+                <a:spcPts val="1200"/>
+              </a:spcAft>
+              <a:defRPr sz="1800">
+                <a:solidFill>
+                  <a:srgbClr val="333333"/>
+                </a:solidFill>
+              </a:defRPr>
+            </a:pPr>
+            <a:r>
+              <a:t>• Sélection offres/numéros</a:t>
+            </a:r>
+          </a:p>
+          <a:p>
+            <a:pPr>
+              <a:spcAft>
+                <a:spcPts val="1200"/>
+              </a:spcAft>
+              <a:defRPr sz="1800">
+                <a:solidFill>
+                  <a:srgbClr val="333333"/>
+                </a:solidFill>
+              </a:defRPr>
+            </a:pPr>
+            <a:r>
+              <a:t>• Capture signature</a:t>
+            </a:r>
+          </a:p>
+          <a:p>
+            <a:pPr>
+              <a:spcAft>
+                <a:spcPts val="1200"/>
+              </a:spcAft>
+              <a:defRPr sz="1800">
+                <a:solidFill>
+                  <a:srgbClr val="333333"/>
+                </a:solidFill>
+              </a:defRPr>
+            </a:pPr>
+            <a:r>
+              <a:t>• Génération PDF</a:t>
+            </a:r>
+          </a:p>
+          <a:p>
+            <a:pPr>
+              <a:spcAft>
+                <a:spcPts val="1200"/>
+              </a:spcAft>
+              <a:defRPr sz="1800">
+                <a:solidFill>
+                  <a:srgbClr val="333333"/>
+                </a:solidFill>
+              </a:defRPr>
+            </a:pPr>
+            <a:r>
+              <a:t>• Historique ventes</a:t>
             </a:r>
           </a:p>
         </p:txBody>
@@ -3621,7 +4517,7 @@
         <p:spPr>
           <a:xfrm>
             <a:off x="0" y="0"/>
-            <a:ext cx="12191695" cy="1371600"/>
+            <a:ext cx="12191695" cy="1188720"/>
           </a:xfrm>
           <a:prstGeom prst="rect">
             <a:avLst/>
@@ -3663,7 +4559,7 @@
         </p:nvSpPr>
         <p:spPr>
           <a:xfrm>
-            <a:off x="457200" y="365760"/>
+            <a:off x="457200" y="320040"/>
             <a:ext cx="11277295" cy="731520"/>
           </a:xfrm>
           <a:prstGeom prst="rect">
@@ -3685,21 +4581,64 @@
               </a:defRPr>
             </a:pPr>
             <a:r>
-              <a:t>Fonctionnalités Clés</a:t>
-            </a:r>
-          </a:p>
-        </p:txBody>
-      </p:sp>
-      <p:sp>
-        <p:nvSpPr>
-          <p:cNvPr id="4" name="TextBox 3"/>
+              <a:t>🔧  Fonctionnalités Clés</a:t>
+            </a:r>
+          </a:p>
+        </p:txBody>
+      </p:sp>
+      <p:sp>
+        <p:nvSpPr>
+          <p:cNvPr id="4" name="Rounded Rectangle 3"/>
+          <p:cNvSpPr/>
+          <p:nvPr/>
+        </p:nvSpPr>
+        <p:spPr>
+          <a:xfrm>
+            <a:off x="457200" y="1554480"/>
+            <a:ext cx="3566160" cy="2194560"/>
+          </a:xfrm>
+          <a:prstGeom prst="roundRect">
+            <a:avLst/>
+          </a:prstGeom>
+          <a:solidFill>
+            <a:srgbClr val="F5F5F5"/>
+          </a:solidFill>
+          <a:ln>
+            <a:noFill/>
+          </a:ln>
+        </p:spPr>
+        <p:style>
+          <a:lnRef idx="1">
+            <a:schemeClr val="accent1"/>
+          </a:lnRef>
+          <a:fillRef idx="3">
+            <a:schemeClr val="accent1"/>
+          </a:fillRef>
+          <a:effectRef idx="2">
+            <a:schemeClr val="accent1"/>
+          </a:effectRef>
+          <a:fontRef idx="minor">
+            <a:schemeClr val="lt1"/>
+          </a:fontRef>
+        </p:style>
+        <p:txBody>
+          <a:bodyPr rtlCol="0" anchor="ctr"/>
+          <a:lstStyle/>
+          <a:p>
+            <a:pPr algn="ctr"/>
+          </a:p>
+        </p:txBody>
+      </p:sp>
+      <p:sp>
+        <p:nvSpPr>
+          <p:cNvPr id="5" name="TextBox 4"/>
           <p:cNvSpPr txBox="1"/>
           <p:nvPr/>
         </p:nvSpPr>
         <p:spPr>
           <a:xfrm>
-            <a:off x="731520" y="1828800"/>
-            <a:ext cx="10728655" cy="4572000"/>
+            <a:off x="457200" y="1737360"/>
+            <a:ext cx="3566160" cy="640080"/>
           </a:xfrm>
           <a:prstGeom prst="rect">
             <a:avLst/>
@@ -3707,98 +4646,806 @@
           <a:noFill/>
         </p:spPr>
         <p:txBody>
-          <a:bodyPr wrap="square">
+          <a:bodyPr wrap="none">
             <a:spAutoFit/>
           </a:bodyPr>
           <a:lstStyle/>
           <a:p>
-            <a:pPr>
-              <a:spcAft>
-                <a:spcPts val="1800"/>
-              </a:spcAft>
-              <a:defRPr sz="2400">
+            <a:pPr algn="ctr">
+              <a:defRPr sz="3600"/>
+            </a:pPr>
+            <a:r>
+              <a:t>🔐</a:t>
+            </a:r>
+          </a:p>
+        </p:txBody>
+      </p:sp>
+      <p:sp>
+        <p:nvSpPr>
+          <p:cNvPr id="6" name="TextBox 5"/>
+          <p:cNvSpPr txBox="1"/>
+          <p:nvPr/>
+        </p:nvSpPr>
+        <p:spPr>
+          <a:xfrm>
+            <a:off x="457200" y="2468880"/>
+            <a:ext cx="3566160" cy="457200"/>
+          </a:xfrm>
+          <a:prstGeom prst="rect">
+            <a:avLst/>
+          </a:prstGeom>
+          <a:noFill/>
+        </p:spPr>
+        <p:txBody>
+          <a:bodyPr wrap="none">
+            <a:spAutoFit/>
+          </a:bodyPr>
+          <a:lstStyle/>
+          <a:p>
+            <a:pPr algn="ctr">
+              <a:defRPr sz="1800" b="1">
                 <a:solidFill>
                   <a:srgbClr val="333333"/>
                 </a:solidFill>
               </a:defRPr>
             </a:pPr>
             <a:r>
-              <a:t>• Gestion des rôles (Administrateur / Agent Commercial)</a:t>
-            </a:r>
-          </a:p>
-          <a:p>
-            <a:pPr>
-              <a:spcAft>
-                <a:spcPts val="1800"/>
-              </a:spcAft>
-              <a:defRPr sz="2400">
+              <a:t>Gestion des Rôles</a:t>
+            </a:r>
+          </a:p>
+        </p:txBody>
+      </p:sp>
+      <p:sp>
+        <p:nvSpPr>
+          <p:cNvPr id="7" name="TextBox 6"/>
+          <p:cNvSpPr txBox="1"/>
+          <p:nvPr/>
+        </p:nvSpPr>
+        <p:spPr>
+          <a:xfrm>
+            <a:off x="457200" y="2926080"/>
+            <a:ext cx="3566160" cy="457200"/>
+          </a:xfrm>
+          <a:prstGeom prst="rect">
+            <a:avLst/>
+          </a:prstGeom>
+          <a:noFill/>
+        </p:spPr>
+        <p:txBody>
+          <a:bodyPr wrap="none">
+            <a:spAutoFit/>
+          </a:bodyPr>
+          <a:lstStyle/>
+          <a:p>
+            <a:pPr algn="ctr">
+              <a:defRPr sz="1400">
+                <a:solidFill>
+                  <a:srgbClr val="808080"/>
+                </a:solidFill>
+              </a:defRPr>
+            </a:pPr>
+            <a:r>
+              <a:t>Admin / Agent</a:t>
+            </a:r>
+          </a:p>
+        </p:txBody>
+      </p:sp>
+      <p:sp>
+        <p:nvSpPr>
+          <p:cNvPr id="8" name="Rounded Rectangle 7"/>
+          <p:cNvSpPr/>
+          <p:nvPr/>
+        </p:nvSpPr>
+        <p:spPr>
+          <a:xfrm>
+            <a:off x="4297680" y="1554480"/>
+            <a:ext cx="3566160" cy="2194560"/>
+          </a:xfrm>
+          <a:prstGeom prst="roundRect">
+            <a:avLst/>
+          </a:prstGeom>
+          <a:solidFill>
+            <a:srgbClr val="F5F5F5"/>
+          </a:solidFill>
+          <a:ln>
+            <a:noFill/>
+          </a:ln>
+        </p:spPr>
+        <p:style>
+          <a:lnRef idx="1">
+            <a:schemeClr val="accent1"/>
+          </a:lnRef>
+          <a:fillRef idx="3">
+            <a:schemeClr val="accent1"/>
+          </a:fillRef>
+          <a:effectRef idx="2">
+            <a:schemeClr val="accent1"/>
+          </a:effectRef>
+          <a:fontRef idx="minor">
+            <a:schemeClr val="lt1"/>
+          </a:fontRef>
+        </p:style>
+        <p:txBody>
+          <a:bodyPr rtlCol="0" anchor="ctr"/>
+          <a:lstStyle/>
+          <a:p>
+            <a:pPr algn="ctr"/>
+          </a:p>
+        </p:txBody>
+      </p:sp>
+      <p:sp>
+        <p:nvSpPr>
+          <p:cNvPr id="9" name="TextBox 8"/>
+          <p:cNvSpPr txBox="1"/>
+          <p:nvPr/>
+        </p:nvSpPr>
+        <p:spPr>
+          <a:xfrm>
+            <a:off x="4297680" y="1737360"/>
+            <a:ext cx="3566160" cy="640080"/>
+          </a:xfrm>
+          <a:prstGeom prst="rect">
+            <a:avLst/>
+          </a:prstGeom>
+          <a:noFill/>
+        </p:spPr>
+        <p:txBody>
+          <a:bodyPr wrap="none">
+            <a:spAutoFit/>
+          </a:bodyPr>
+          <a:lstStyle/>
+          <a:p>
+            <a:pPr algn="ctr">
+              <a:defRPr sz="3600"/>
+            </a:pPr>
+            <a:r>
+              <a:t>📋</a:t>
+            </a:r>
+          </a:p>
+        </p:txBody>
+      </p:sp>
+      <p:sp>
+        <p:nvSpPr>
+          <p:cNvPr id="10" name="TextBox 9"/>
+          <p:cNvSpPr txBox="1"/>
+          <p:nvPr/>
+        </p:nvSpPr>
+        <p:spPr>
+          <a:xfrm>
+            <a:off x="4297680" y="2468880"/>
+            <a:ext cx="3566160" cy="457200"/>
+          </a:xfrm>
+          <a:prstGeom prst="rect">
+            <a:avLst/>
+          </a:prstGeom>
+          <a:noFill/>
+        </p:spPr>
+        <p:txBody>
+          <a:bodyPr wrap="none">
+            <a:spAutoFit/>
+          </a:bodyPr>
+          <a:lstStyle/>
+          <a:p>
+            <a:pPr algn="ctr">
+              <a:defRPr sz="1800" b="1">
                 <a:solidFill>
                   <a:srgbClr val="333333"/>
                 </a:solidFill>
               </a:defRPr>
             </a:pPr>
             <a:r>
-              <a:t>• Gestion des offres et inventaire des numéros</a:t>
-            </a:r>
-          </a:p>
-          <a:p>
-            <a:pPr>
-              <a:spcAft>
-                <a:spcPts val="1800"/>
-              </a:spcAft>
-              <a:defRPr sz="2400">
+              <a:t>Offres &amp; Numéros</a:t>
+            </a:r>
+          </a:p>
+        </p:txBody>
+      </p:sp>
+      <p:sp>
+        <p:nvSpPr>
+          <p:cNvPr id="11" name="TextBox 10"/>
+          <p:cNvSpPr txBox="1"/>
+          <p:nvPr/>
+        </p:nvSpPr>
+        <p:spPr>
+          <a:xfrm>
+            <a:off x="4297680" y="2926080"/>
+            <a:ext cx="3566160" cy="457200"/>
+          </a:xfrm>
+          <a:prstGeom prst="rect">
+            <a:avLst/>
+          </a:prstGeom>
+          <a:noFill/>
+        </p:spPr>
+        <p:txBody>
+          <a:bodyPr wrap="none">
+            <a:spAutoFit/>
+          </a:bodyPr>
+          <a:lstStyle/>
+          <a:p>
+            <a:pPr algn="ctr">
+              <a:defRPr sz="1400">
+                <a:solidFill>
+                  <a:srgbClr val="808080"/>
+                </a:solidFill>
+              </a:defRPr>
+            </a:pPr>
+            <a:r>
+              <a:t>Inventaire temps réel</a:t>
+            </a:r>
+          </a:p>
+        </p:txBody>
+      </p:sp>
+      <p:sp>
+        <p:nvSpPr>
+          <p:cNvPr id="12" name="Rounded Rectangle 11"/>
+          <p:cNvSpPr/>
+          <p:nvPr/>
+        </p:nvSpPr>
+        <p:spPr>
+          <a:xfrm>
+            <a:off x="8138160" y="1554480"/>
+            <a:ext cx="3566160" cy="2194560"/>
+          </a:xfrm>
+          <a:prstGeom prst="roundRect">
+            <a:avLst/>
+          </a:prstGeom>
+          <a:solidFill>
+            <a:srgbClr val="F5F5F5"/>
+          </a:solidFill>
+          <a:ln>
+            <a:noFill/>
+          </a:ln>
+        </p:spPr>
+        <p:style>
+          <a:lnRef idx="1">
+            <a:schemeClr val="accent1"/>
+          </a:lnRef>
+          <a:fillRef idx="3">
+            <a:schemeClr val="accent1"/>
+          </a:fillRef>
+          <a:effectRef idx="2">
+            <a:schemeClr val="accent1"/>
+          </a:effectRef>
+          <a:fontRef idx="minor">
+            <a:schemeClr val="lt1"/>
+          </a:fontRef>
+        </p:style>
+        <p:txBody>
+          <a:bodyPr rtlCol="0" anchor="ctr"/>
+          <a:lstStyle/>
+          <a:p>
+            <a:pPr algn="ctr"/>
+          </a:p>
+        </p:txBody>
+      </p:sp>
+      <p:sp>
+        <p:nvSpPr>
+          <p:cNvPr id="13" name="TextBox 12"/>
+          <p:cNvSpPr txBox="1"/>
+          <p:nvPr/>
+        </p:nvSpPr>
+        <p:spPr>
+          <a:xfrm>
+            <a:off x="8138160" y="1737360"/>
+            <a:ext cx="3566160" cy="640080"/>
+          </a:xfrm>
+          <a:prstGeom prst="rect">
+            <a:avLst/>
+          </a:prstGeom>
+          <a:noFill/>
+        </p:spPr>
+        <p:txBody>
+          <a:bodyPr wrap="none">
+            <a:spAutoFit/>
+          </a:bodyPr>
+          <a:lstStyle/>
+          <a:p>
+            <a:pPr algn="ctr">
+              <a:defRPr sz="3600"/>
+            </a:pPr>
+            <a:r>
+              <a:t>🪪</a:t>
+            </a:r>
+          </a:p>
+        </p:txBody>
+      </p:sp>
+      <p:sp>
+        <p:nvSpPr>
+          <p:cNvPr id="14" name="TextBox 13"/>
+          <p:cNvSpPr txBox="1"/>
+          <p:nvPr/>
+        </p:nvSpPr>
+        <p:spPr>
+          <a:xfrm>
+            <a:off x="8138160" y="2468880"/>
+            <a:ext cx="3566160" cy="457200"/>
+          </a:xfrm>
+          <a:prstGeom prst="rect">
+            <a:avLst/>
+          </a:prstGeom>
+          <a:noFill/>
+        </p:spPr>
+        <p:txBody>
+          <a:bodyPr wrap="none">
+            <a:spAutoFit/>
+          </a:bodyPr>
+          <a:lstStyle/>
+          <a:p>
+            <a:pPr algn="ctr">
+              <a:defRPr sz="1800" b="1">
                 <a:solidFill>
                   <a:srgbClr val="333333"/>
                 </a:solidFill>
               </a:defRPr>
             </a:pPr>
             <a:r>
-              <a:t>• Lecture CNI : caméra (MRZ) + puce NFC</a:t>
-            </a:r>
-          </a:p>
-          <a:p>
-            <a:pPr>
-              <a:spcAft>
-                <a:spcPts val="1800"/>
-              </a:spcAft>
-              <a:defRPr sz="2400">
+              <a:t>Scan CNI</a:t>
+            </a:r>
+          </a:p>
+        </p:txBody>
+      </p:sp>
+      <p:sp>
+        <p:nvSpPr>
+          <p:cNvPr id="15" name="TextBox 14"/>
+          <p:cNvSpPr txBox="1"/>
+          <p:nvPr/>
+        </p:nvSpPr>
+        <p:spPr>
+          <a:xfrm>
+            <a:off x="8138160" y="2926080"/>
+            <a:ext cx="3566160" cy="457200"/>
+          </a:xfrm>
+          <a:prstGeom prst="rect">
+            <a:avLst/>
+          </a:prstGeom>
+          <a:noFill/>
+        </p:spPr>
+        <p:txBody>
+          <a:bodyPr wrap="none">
+            <a:spAutoFit/>
+          </a:bodyPr>
+          <a:lstStyle/>
+          <a:p>
+            <a:pPr algn="ctr">
+              <a:defRPr sz="1400">
+                <a:solidFill>
+                  <a:srgbClr val="808080"/>
+                </a:solidFill>
+              </a:defRPr>
+            </a:pPr>
+            <a:r>
+              <a:t>MRZ + Puce NFC</a:t>
+            </a:r>
+          </a:p>
+        </p:txBody>
+      </p:sp>
+      <p:sp>
+        <p:nvSpPr>
+          <p:cNvPr id="16" name="Rounded Rectangle 15"/>
+          <p:cNvSpPr/>
+          <p:nvPr/>
+        </p:nvSpPr>
+        <p:spPr>
+          <a:xfrm>
+            <a:off x="457200" y="4023360"/>
+            <a:ext cx="3566160" cy="2194560"/>
+          </a:xfrm>
+          <a:prstGeom prst="roundRect">
+            <a:avLst/>
+          </a:prstGeom>
+          <a:solidFill>
+            <a:srgbClr val="F5F5F5"/>
+          </a:solidFill>
+          <a:ln>
+            <a:noFill/>
+          </a:ln>
+        </p:spPr>
+        <p:style>
+          <a:lnRef idx="1">
+            <a:schemeClr val="accent1"/>
+          </a:lnRef>
+          <a:fillRef idx="3">
+            <a:schemeClr val="accent1"/>
+          </a:fillRef>
+          <a:effectRef idx="2">
+            <a:schemeClr val="accent1"/>
+          </a:effectRef>
+          <a:fontRef idx="minor">
+            <a:schemeClr val="lt1"/>
+          </a:fontRef>
+        </p:style>
+        <p:txBody>
+          <a:bodyPr rtlCol="0" anchor="ctr"/>
+          <a:lstStyle/>
+          <a:p>
+            <a:pPr algn="ctr"/>
+          </a:p>
+        </p:txBody>
+      </p:sp>
+      <p:sp>
+        <p:nvSpPr>
+          <p:cNvPr id="17" name="TextBox 16"/>
+          <p:cNvSpPr txBox="1"/>
+          <p:nvPr/>
+        </p:nvSpPr>
+        <p:spPr>
+          <a:xfrm>
+            <a:off x="457200" y="4206240"/>
+            <a:ext cx="3566160" cy="640080"/>
+          </a:xfrm>
+          <a:prstGeom prst="rect">
+            <a:avLst/>
+          </a:prstGeom>
+          <a:noFill/>
+        </p:spPr>
+        <p:txBody>
+          <a:bodyPr wrap="none">
+            <a:spAutoFit/>
+          </a:bodyPr>
+          <a:lstStyle/>
+          <a:p>
+            <a:pPr algn="ctr">
+              <a:defRPr sz="3600"/>
+            </a:pPr>
+            <a:r>
+              <a:t>✍️</a:t>
+            </a:r>
+          </a:p>
+        </p:txBody>
+      </p:sp>
+      <p:sp>
+        <p:nvSpPr>
+          <p:cNvPr id="18" name="TextBox 17"/>
+          <p:cNvSpPr txBox="1"/>
+          <p:nvPr/>
+        </p:nvSpPr>
+        <p:spPr>
+          <a:xfrm>
+            <a:off x="457200" y="4937760"/>
+            <a:ext cx="3566160" cy="457200"/>
+          </a:xfrm>
+          <a:prstGeom prst="rect">
+            <a:avLst/>
+          </a:prstGeom>
+          <a:noFill/>
+        </p:spPr>
+        <p:txBody>
+          <a:bodyPr wrap="none">
+            <a:spAutoFit/>
+          </a:bodyPr>
+          <a:lstStyle/>
+          <a:p>
+            <a:pPr algn="ctr">
+              <a:defRPr sz="1800" b="1">
                 <a:solidFill>
                   <a:srgbClr val="333333"/>
                 </a:solidFill>
               </a:defRPr>
             </a:pPr>
             <a:r>
-              <a:t>• Capture de signature numérique</a:t>
-            </a:r>
-          </a:p>
-          <a:p>
-            <a:pPr>
-              <a:spcAft>
-                <a:spcPts val="1800"/>
-              </a:spcAft>
-              <a:defRPr sz="2400">
+              <a:t>Signature</a:t>
+            </a:r>
+          </a:p>
+        </p:txBody>
+      </p:sp>
+      <p:sp>
+        <p:nvSpPr>
+          <p:cNvPr id="19" name="TextBox 18"/>
+          <p:cNvSpPr txBox="1"/>
+          <p:nvPr/>
+        </p:nvSpPr>
+        <p:spPr>
+          <a:xfrm>
+            <a:off x="457200" y="5394960"/>
+            <a:ext cx="3566160" cy="457200"/>
+          </a:xfrm>
+          <a:prstGeom prst="rect">
+            <a:avLst/>
+          </a:prstGeom>
+          <a:noFill/>
+        </p:spPr>
+        <p:txBody>
+          <a:bodyPr wrap="none">
+            <a:spAutoFit/>
+          </a:bodyPr>
+          <a:lstStyle/>
+          <a:p>
+            <a:pPr algn="ctr">
+              <a:defRPr sz="1400">
+                <a:solidFill>
+                  <a:srgbClr val="808080"/>
+                </a:solidFill>
+              </a:defRPr>
+            </a:pPr>
+            <a:r>
+              <a:t>Capture numérique</a:t>
+            </a:r>
+          </a:p>
+        </p:txBody>
+      </p:sp>
+      <p:sp>
+        <p:nvSpPr>
+          <p:cNvPr id="20" name="Rounded Rectangle 19"/>
+          <p:cNvSpPr/>
+          <p:nvPr/>
+        </p:nvSpPr>
+        <p:spPr>
+          <a:xfrm>
+            <a:off x="4297680" y="4023360"/>
+            <a:ext cx="3566160" cy="2194560"/>
+          </a:xfrm>
+          <a:prstGeom prst="roundRect">
+            <a:avLst/>
+          </a:prstGeom>
+          <a:solidFill>
+            <a:srgbClr val="F5F5F5"/>
+          </a:solidFill>
+          <a:ln>
+            <a:noFill/>
+          </a:ln>
+        </p:spPr>
+        <p:style>
+          <a:lnRef idx="1">
+            <a:schemeClr val="accent1"/>
+          </a:lnRef>
+          <a:fillRef idx="3">
+            <a:schemeClr val="accent1"/>
+          </a:fillRef>
+          <a:effectRef idx="2">
+            <a:schemeClr val="accent1"/>
+          </a:effectRef>
+          <a:fontRef idx="minor">
+            <a:schemeClr val="lt1"/>
+          </a:fontRef>
+        </p:style>
+        <p:txBody>
+          <a:bodyPr rtlCol="0" anchor="ctr"/>
+          <a:lstStyle/>
+          <a:p>
+            <a:pPr algn="ctr"/>
+          </a:p>
+        </p:txBody>
+      </p:sp>
+      <p:sp>
+        <p:nvSpPr>
+          <p:cNvPr id="21" name="TextBox 20"/>
+          <p:cNvSpPr txBox="1"/>
+          <p:nvPr/>
+        </p:nvSpPr>
+        <p:spPr>
+          <a:xfrm>
+            <a:off x="4297680" y="4206240"/>
+            <a:ext cx="3566160" cy="640080"/>
+          </a:xfrm>
+          <a:prstGeom prst="rect">
+            <a:avLst/>
+          </a:prstGeom>
+          <a:noFill/>
+        </p:spPr>
+        <p:txBody>
+          <a:bodyPr wrap="none">
+            <a:spAutoFit/>
+          </a:bodyPr>
+          <a:lstStyle/>
+          <a:p>
+            <a:pPr algn="ctr">
+              <a:defRPr sz="3600"/>
+            </a:pPr>
+            <a:r>
+              <a:t>📄</a:t>
+            </a:r>
+          </a:p>
+        </p:txBody>
+      </p:sp>
+      <p:sp>
+        <p:nvSpPr>
+          <p:cNvPr id="22" name="TextBox 21"/>
+          <p:cNvSpPr txBox="1"/>
+          <p:nvPr/>
+        </p:nvSpPr>
+        <p:spPr>
+          <a:xfrm>
+            <a:off x="4297680" y="4937760"/>
+            <a:ext cx="3566160" cy="457200"/>
+          </a:xfrm>
+          <a:prstGeom prst="rect">
+            <a:avLst/>
+          </a:prstGeom>
+          <a:noFill/>
+        </p:spPr>
+        <p:txBody>
+          <a:bodyPr wrap="none">
+            <a:spAutoFit/>
+          </a:bodyPr>
+          <a:lstStyle/>
+          <a:p>
+            <a:pPr algn="ctr">
+              <a:defRPr sz="1800" b="1">
                 <a:solidFill>
                   <a:srgbClr val="333333"/>
                 </a:solidFill>
               </a:defRPr>
             </a:pPr>
             <a:r>
-              <a:t>• Génération PDF bilingue (Français / Arabe)</a:t>
-            </a:r>
-          </a:p>
-          <a:p>
-            <a:pPr>
-              <a:spcAft>
-                <a:spcPts val="1800"/>
-              </a:spcAft>
-              <a:defRPr sz="2400">
+              <a:t>PDF Bilingue</a:t>
+            </a:r>
+          </a:p>
+        </p:txBody>
+      </p:sp>
+      <p:sp>
+        <p:nvSpPr>
+          <p:cNvPr id="23" name="TextBox 22"/>
+          <p:cNvSpPr txBox="1"/>
+          <p:nvPr/>
+        </p:nvSpPr>
+        <p:spPr>
+          <a:xfrm>
+            <a:off x="4297680" y="5394960"/>
+            <a:ext cx="3566160" cy="457200"/>
+          </a:xfrm>
+          <a:prstGeom prst="rect">
+            <a:avLst/>
+          </a:prstGeom>
+          <a:noFill/>
+        </p:spPr>
+        <p:txBody>
+          <a:bodyPr wrap="none">
+            <a:spAutoFit/>
+          </a:bodyPr>
+          <a:lstStyle/>
+          <a:p>
+            <a:pPr algn="ctr">
+              <a:defRPr sz="1400">
+                <a:solidFill>
+                  <a:srgbClr val="808080"/>
+                </a:solidFill>
+              </a:defRPr>
+            </a:pPr>
+            <a:r>
+              <a:t>Français / Arabe</a:t>
+            </a:r>
+          </a:p>
+        </p:txBody>
+      </p:sp>
+      <p:sp>
+        <p:nvSpPr>
+          <p:cNvPr id="24" name="Rounded Rectangle 23"/>
+          <p:cNvSpPr/>
+          <p:nvPr/>
+        </p:nvSpPr>
+        <p:spPr>
+          <a:xfrm>
+            <a:off x="8138160" y="4023360"/>
+            <a:ext cx="3566160" cy="2194560"/>
+          </a:xfrm>
+          <a:prstGeom prst="roundRect">
+            <a:avLst/>
+          </a:prstGeom>
+          <a:solidFill>
+            <a:srgbClr val="F5F5F5"/>
+          </a:solidFill>
+          <a:ln>
+            <a:noFill/>
+          </a:ln>
+        </p:spPr>
+        <p:style>
+          <a:lnRef idx="1">
+            <a:schemeClr val="accent1"/>
+          </a:lnRef>
+          <a:fillRef idx="3">
+            <a:schemeClr val="accent1"/>
+          </a:fillRef>
+          <a:effectRef idx="2">
+            <a:schemeClr val="accent1"/>
+          </a:effectRef>
+          <a:fontRef idx="minor">
+            <a:schemeClr val="lt1"/>
+          </a:fontRef>
+        </p:style>
+        <p:txBody>
+          <a:bodyPr rtlCol="0" anchor="ctr"/>
+          <a:lstStyle/>
+          <a:p>
+            <a:pPr algn="ctr"/>
+          </a:p>
+        </p:txBody>
+      </p:sp>
+      <p:sp>
+        <p:nvSpPr>
+          <p:cNvPr id="25" name="TextBox 24"/>
+          <p:cNvSpPr txBox="1"/>
+          <p:nvPr/>
+        </p:nvSpPr>
+        <p:spPr>
+          <a:xfrm>
+            <a:off x="8138160" y="4206240"/>
+            <a:ext cx="3566160" cy="640080"/>
+          </a:xfrm>
+          <a:prstGeom prst="rect">
+            <a:avLst/>
+          </a:prstGeom>
+          <a:noFill/>
+        </p:spPr>
+        <p:txBody>
+          <a:bodyPr wrap="none">
+            <a:spAutoFit/>
+          </a:bodyPr>
+          <a:lstStyle/>
+          <a:p>
+            <a:pPr algn="ctr">
+              <a:defRPr sz="3600"/>
+            </a:pPr>
+            <a:r>
+              <a:t>📊</a:t>
+            </a:r>
+          </a:p>
+        </p:txBody>
+      </p:sp>
+      <p:sp>
+        <p:nvSpPr>
+          <p:cNvPr id="26" name="TextBox 25"/>
+          <p:cNvSpPr txBox="1"/>
+          <p:nvPr/>
+        </p:nvSpPr>
+        <p:spPr>
+          <a:xfrm>
+            <a:off x="8138160" y="4937760"/>
+            <a:ext cx="3566160" cy="457200"/>
+          </a:xfrm>
+          <a:prstGeom prst="rect">
+            <a:avLst/>
+          </a:prstGeom>
+          <a:noFill/>
+        </p:spPr>
+        <p:txBody>
+          <a:bodyPr wrap="none">
+            <a:spAutoFit/>
+          </a:bodyPr>
+          <a:lstStyle/>
+          <a:p>
+            <a:pPr algn="ctr">
+              <a:defRPr sz="1800" b="1">
                 <a:solidFill>
                   <a:srgbClr val="333333"/>
                 </a:solidFill>
               </a:defRPr>
             </a:pPr>
             <a:r>
-              <a:t>• Tableaux de bord avec statistiques en temps réel</a:t>
+              <a:t>Statistiques</a:t>
+            </a:r>
+          </a:p>
+        </p:txBody>
+      </p:sp>
+      <p:sp>
+        <p:nvSpPr>
+          <p:cNvPr id="27" name="TextBox 26"/>
+          <p:cNvSpPr txBox="1"/>
+          <p:nvPr/>
+        </p:nvSpPr>
+        <p:spPr>
+          <a:xfrm>
+            <a:off x="8138160" y="5394960"/>
+            <a:ext cx="3566160" cy="457200"/>
+          </a:xfrm>
+          <a:prstGeom prst="rect">
+            <a:avLst/>
+          </a:prstGeom>
+          <a:noFill/>
+        </p:spPr>
+        <p:txBody>
+          <a:bodyPr wrap="none">
+            <a:spAutoFit/>
+          </a:bodyPr>
+          <a:lstStyle/>
+          <a:p>
+            <a:pPr algn="ctr">
+              <a:defRPr sz="1400">
+                <a:solidFill>
+                  <a:srgbClr val="808080"/>
+                </a:solidFill>
+              </a:defRPr>
+            </a:pPr>
+            <a:r>
+              <a:t>Tableaux de bord</a:t>
             </a:r>
           </a:p>
         </p:txBody>
@@ -3830,7 +5477,7 @@
         <p:spPr>
           <a:xfrm>
             <a:off x="0" y="0"/>
-            <a:ext cx="12191695" cy="1371600"/>
+            <a:ext cx="12191695" cy="1188720"/>
           </a:xfrm>
           <a:prstGeom prst="rect">
             <a:avLst/>
@@ -3872,7 +5519,7 @@
         </p:nvSpPr>
         <p:spPr>
           <a:xfrm>
-            <a:off x="457200" y="365760"/>
+            <a:off x="457200" y="320040"/>
             <a:ext cx="11277295" cy="731520"/>
           </a:xfrm>
           <a:prstGeom prst="rect">
@@ -3894,21 +5541,64 @@
               </a:defRPr>
             </a:pPr>
             <a:r>
-              <a:t>Stack Technique</a:t>
-            </a:r>
-          </a:p>
-        </p:txBody>
-      </p:sp>
-      <p:sp>
-        <p:nvSpPr>
-          <p:cNvPr id="4" name="TextBox 3"/>
+              <a:t>⚙️  Architecture Technique</a:t>
+            </a:r>
+          </a:p>
+        </p:txBody>
+      </p:sp>
+      <p:sp>
+        <p:nvSpPr>
+          <p:cNvPr id="4" name="Rounded Rectangle 3"/>
+          <p:cNvSpPr/>
+          <p:nvPr/>
+        </p:nvSpPr>
+        <p:spPr>
+          <a:xfrm>
+            <a:off x="731520" y="1828800"/>
+            <a:ext cx="2560320" cy="1371600"/>
+          </a:xfrm>
+          <a:prstGeom prst="roundRect">
+            <a:avLst/>
+          </a:prstGeom>
+          <a:solidFill>
+            <a:srgbClr val="E30613"/>
+          </a:solidFill>
+          <a:ln>
+            <a:noFill/>
+          </a:ln>
+        </p:spPr>
+        <p:style>
+          <a:lnRef idx="1">
+            <a:schemeClr val="accent1"/>
+          </a:lnRef>
+          <a:fillRef idx="3">
+            <a:schemeClr val="accent1"/>
+          </a:fillRef>
+          <a:effectRef idx="2">
+            <a:schemeClr val="accent1"/>
+          </a:effectRef>
+          <a:fontRef idx="minor">
+            <a:schemeClr val="lt1"/>
+          </a:fontRef>
+        </p:style>
+        <p:txBody>
+          <a:bodyPr rtlCol="0" anchor="ctr"/>
+          <a:lstStyle/>
+          <a:p>
+            <a:pPr algn="ctr"/>
+          </a:p>
+        </p:txBody>
+      </p:sp>
+      <p:sp>
+        <p:nvSpPr>
+          <p:cNvPr id="5" name="TextBox 4"/>
           <p:cNvSpPr txBox="1"/>
           <p:nvPr/>
         </p:nvSpPr>
         <p:spPr>
           <a:xfrm>
-            <a:off x="731520" y="1828800"/>
-            <a:ext cx="10728655" cy="4572000"/>
+            <a:off x="731520" y="1965960"/>
+            <a:ext cx="2560320" cy="457200"/>
           </a:xfrm>
           <a:prstGeom prst="rect">
             <a:avLst/>
@@ -3916,87 +5606,627 @@
           <a:noFill/>
         </p:spPr>
         <p:txBody>
-          <a:bodyPr wrap="square">
+          <a:bodyPr wrap="none">
             <a:spAutoFit/>
           </a:bodyPr>
           <a:lstStyle/>
           <a:p>
-            <a:pPr>
-              <a:spcAft>
-                <a:spcPts val="1800"/>
-              </a:spcAft>
-              <a:defRPr sz="2400">
+            <a:pPr algn="ctr">
+              <a:defRPr sz="2800"/>
+            </a:pPr>
+            <a:r>
+              <a:t>📱</a:t>
+            </a:r>
+          </a:p>
+        </p:txBody>
+      </p:sp>
+      <p:sp>
+        <p:nvSpPr>
+          <p:cNvPr id="6" name="TextBox 5"/>
+          <p:cNvSpPr txBox="1"/>
+          <p:nvPr/>
+        </p:nvSpPr>
+        <p:spPr>
+          <a:xfrm>
+            <a:off x="731520" y="2423160"/>
+            <a:ext cx="2560320" cy="365760"/>
+          </a:xfrm>
+          <a:prstGeom prst="rect">
+            <a:avLst/>
+          </a:prstGeom>
+          <a:noFill/>
+        </p:spPr>
+        <p:txBody>
+          <a:bodyPr wrap="none">
+            <a:spAutoFit/>
+          </a:bodyPr>
+          <a:lstStyle/>
+          <a:p>
+            <a:pPr algn="ctr">
+              <a:defRPr sz="1600" b="1">
                 <a:solidFill>
-                  <a:srgbClr val="333333"/>
+                  <a:srgbClr val="FFFFFF"/>
                 </a:solidFill>
               </a:defRPr>
             </a:pPr>
             <a:r>
-              <a:t>• Backend : Django + Django REST Framework</a:t>
-            </a:r>
-          </a:p>
-          <a:p>
-            <a:pPr>
-              <a:spcAft>
-                <a:spcPts val="1800"/>
-              </a:spcAft>
-              <a:defRPr sz="2400">
+              <a:t>Mobile</a:t>
+            </a:r>
+          </a:p>
+        </p:txBody>
+      </p:sp>
+      <p:sp>
+        <p:nvSpPr>
+          <p:cNvPr id="7" name="TextBox 6"/>
+          <p:cNvSpPr txBox="1"/>
+          <p:nvPr/>
+        </p:nvSpPr>
+        <p:spPr>
+          <a:xfrm>
+            <a:off x="731520" y="2743200"/>
+            <a:ext cx="2560320" cy="365760"/>
+          </a:xfrm>
+          <a:prstGeom prst="rect">
+            <a:avLst/>
+          </a:prstGeom>
+          <a:noFill/>
+        </p:spPr>
+        <p:txBody>
+          <a:bodyPr wrap="none">
+            <a:spAutoFit/>
+          </a:bodyPr>
+          <a:lstStyle/>
+          <a:p>
+            <a:pPr algn="ctr">
+              <a:defRPr sz="1200">
                 <a:solidFill>
-                  <a:srgbClr val="333333"/>
+                  <a:srgbClr val="FFFFFF"/>
                 </a:solidFill>
               </a:defRPr>
             </a:pPr>
             <a:r>
-              <a:t>• Web Dashboard : Alpine.js + TailwindCSS</a:t>
-            </a:r>
-          </a:p>
-          <a:p>
-            <a:pPr>
-              <a:spcAft>
-                <a:spcPts val="1800"/>
-              </a:spcAft>
-              <a:defRPr sz="2400">
+              <a:t>Flutter</a:t>
+            </a:r>
+          </a:p>
+        </p:txBody>
+      </p:sp>
+      <p:sp>
+        <p:nvSpPr>
+          <p:cNvPr id="8" name="Rounded Rectangle 7"/>
+          <p:cNvSpPr/>
+          <p:nvPr/>
+        </p:nvSpPr>
+        <p:spPr>
+          <a:xfrm>
+            <a:off x="731520" y="4114800"/>
+            <a:ext cx="2560320" cy="1371600"/>
+          </a:xfrm>
+          <a:prstGeom prst="roundRect">
+            <a:avLst/>
+          </a:prstGeom>
+          <a:solidFill>
+            <a:srgbClr val="3B82F6"/>
+          </a:solidFill>
+          <a:ln>
+            <a:noFill/>
+          </a:ln>
+        </p:spPr>
+        <p:style>
+          <a:lnRef idx="1">
+            <a:schemeClr val="accent1"/>
+          </a:lnRef>
+          <a:fillRef idx="3">
+            <a:schemeClr val="accent1"/>
+          </a:fillRef>
+          <a:effectRef idx="2">
+            <a:schemeClr val="accent1"/>
+          </a:effectRef>
+          <a:fontRef idx="minor">
+            <a:schemeClr val="lt1"/>
+          </a:fontRef>
+        </p:style>
+        <p:txBody>
+          <a:bodyPr rtlCol="0" anchor="ctr"/>
+          <a:lstStyle/>
+          <a:p>
+            <a:pPr algn="ctr"/>
+          </a:p>
+        </p:txBody>
+      </p:sp>
+      <p:sp>
+        <p:nvSpPr>
+          <p:cNvPr id="9" name="TextBox 8"/>
+          <p:cNvSpPr txBox="1"/>
+          <p:nvPr/>
+        </p:nvSpPr>
+        <p:spPr>
+          <a:xfrm>
+            <a:off x="731520" y="4251960"/>
+            <a:ext cx="2560320" cy="457200"/>
+          </a:xfrm>
+          <a:prstGeom prst="rect">
+            <a:avLst/>
+          </a:prstGeom>
+          <a:noFill/>
+        </p:spPr>
+        <p:txBody>
+          <a:bodyPr wrap="none">
+            <a:spAutoFit/>
+          </a:bodyPr>
+          <a:lstStyle/>
+          <a:p>
+            <a:pPr algn="ctr">
+              <a:defRPr sz="2800"/>
+            </a:pPr>
+            <a:r>
+              <a:t>🖥️</a:t>
+            </a:r>
+          </a:p>
+        </p:txBody>
+      </p:sp>
+      <p:sp>
+        <p:nvSpPr>
+          <p:cNvPr id="10" name="TextBox 9"/>
+          <p:cNvSpPr txBox="1"/>
+          <p:nvPr/>
+        </p:nvSpPr>
+        <p:spPr>
+          <a:xfrm>
+            <a:off x="731520" y="4709160"/>
+            <a:ext cx="2560320" cy="365760"/>
+          </a:xfrm>
+          <a:prstGeom prst="rect">
+            <a:avLst/>
+          </a:prstGeom>
+          <a:noFill/>
+        </p:spPr>
+        <p:txBody>
+          <a:bodyPr wrap="none">
+            <a:spAutoFit/>
+          </a:bodyPr>
+          <a:lstStyle/>
+          <a:p>
+            <a:pPr algn="ctr">
+              <a:defRPr sz="1600" b="1">
                 <a:solidFill>
-                  <a:srgbClr val="333333"/>
+                  <a:srgbClr val="FFFFFF"/>
                 </a:solidFill>
               </a:defRPr>
             </a:pPr>
             <a:r>
-              <a:t>• Mobile : Flutter (iOS / Android)</a:t>
-            </a:r>
-          </a:p>
-          <a:p>
-            <a:pPr>
-              <a:spcAft>
-                <a:spcPts val="1800"/>
-              </a:spcAft>
-              <a:defRPr sz="2400">
+              <a:t>Web</a:t>
+            </a:r>
+          </a:p>
+        </p:txBody>
+      </p:sp>
+      <p:sp>
+        <p:nvSpPr>
+          <p:cNvPr id="11" name="TextBox 10"/>
+          <p:cNvSpPr txBox="1"/>
+          <p:nvPr/>
+        </p:nvSpPr>
+        <p:spPr>
+          <a:xfrm>
+            <a:off x="731520" y="5029200"/>
+            <a:ext cx="2560320" cy="365760"/>
+          </a:xfrm>
+          <a:prstGeom prst="rect">
+            <a:avLst/>
+          </a:prstGeom>
+          <a:noFill/>
+        </p:spPr>
+        <p:txBody>
+          <a:bodyPr wrap="none">
+            <a:spAutoFit/>
+          </a:bodyPr>
+          <a:lstStyle/>
+          <a:p>
+            <a:pPr algn="ctr">
+              <a:defRPr sz="1200">
                 <a:solidFill>
-                  <a:srgbClr val="333333"/>
+                  <a:srgbClr val="FFFFFF"/>
                 </a:solidFill>
               </a:defRPr>
             </a:pPr>
             <a:r>
-              <a:t>• Base de données : PostgreSQL</a:t>
-            </a:r>
-          </a:p>
-          <a:p>
-            <a:pPr>
-              <a:spcAft>
-                <a:spcPts val="1800"/>
-              </a:spcAft>
-              <a:defRPr sz="2400">
+              <a:t>Alpine.js + Tailwind</a:t>
+            </a:r>
+          </a:p>
+        </p:txBody>
+      </p:sp>
+      <p:sp>
+        <p:nvSpPr>
+          <p:cNvPr id="12" name="Rounded Rectangle 11"/>
+          <p:cNvSpPr/>
+          <p:nvPr/>
+        </p:nvSpPr>
+        <p:spPr>
+          <a:xfrm>
+            <a:off x="4754880" y="2971800"/>
+            <a:ext cx="2743200" cy="1371600"/>
+          </a:xfrm>
+          <a:prstGeom prst="roundRect">
+            <a:avLst/>
+          </a:prstGeom>
+          <a:solidFill>
+            <a:srgbClr val="22C55E"/>
+          </a:solidFill>
+          <a:ln>
+            <a:noFill/>
+          </a:ln>
+        </p:spPr>
+        <p:style>
+          <a:lnRef idx="1">
+            <a:schemeClr val="accent1"/>
+          </a:lnRef>
+          <a:fillRef idx="3">
+            <a:schemeClr val="accent1"/>
+          </a:fillRef>
+          <a:effectRef idx="2">
+            <a:schemeClr val="accent1"/>
+          </a:effectRef>
+          <a:fontRef idx="minor">
+            <a:schemeClr val="lt1"/>
+          </a:fontRef>
+        </p:style>
+        <p:txBody>
+          <a:bodyPr rtlCol="0" anchor="ctr"/>
+          <a:lstStyle/>
+          <a:p>
+            <a:pPr algn="ctr"/>
+          </a:p>
+        </p:txBody>
+      </p:sp>
+      <p:sp>
+        <p:nvSpPr>
+          <p:cNvPr id="13" name="TextBox 12"/>
+          <p:cNvSpPr txBox="1"/>
+          <p:nvPr/>
+        </p:nvSpPr>
+        <p:spPr>
+          <a:xfrm>
+            <a:off x="4754880" y="3108960"/>
+            <a:ext cx="2743200" cy="457200"/>
+          </a:xfrm>
+          <a:prstGeom prst="rect">
+            <a:avLst/>
+          </a:prstGeom>
+          <a:noFill/>
+        </p:spPr>
+        <p:txBody>
+          <a:bodyPr wrap="none">
+            <a:spAutoFit/>
+          </a:bodyPr>
+          <a:lstStyle/>
+          <a:p>
+            <a:pPr algn="ctr">
+              <a:defRPr sz="2800"/>
+            </a:pPr>
+            <a:r>
+              <a:t>🔌</a:t>
+            </a:r>
+          </a:p>
+        </p:txBody>
+      </p:sp>
+      <p:sp>
+        <p:nvSpPr>
+          <p:cNvPr id="14" name="TextBox 13"/>
+          <p:cNvSpPr txBox="1"/>
+          <p:nvPr/>
+        </p:nvSpPr>
+        <p:spPr>
+          <a:xfrm>
+            <a:off x="4754880" y="3566160"/>
+            <a:ext cx="2743200" cy="365760"/>
+          </a:xfrm>
+          <a:prstGeom prst="rect">
+            <a:avLst/>
+          </a:prstGeom>
+          <a:noFill/>
+        </p:spPr>
+        <p:txBody>
+          <a:bodyPr wrap="none">
+            <a:spAutoFit/>
+          </a:bodyPr>
+          <a:lstStyle/>
+          <a:p>
+            <a:pPr algn="ctr">
+              <a:defRPr sz="1600" b="1">
                 <a:solidFill>
-                  <a:srgbClr val="333333"/>
+                  <a:srgbClr val="FFFFFF"/>
                 </a:solidFill>
               </a:defRPr>
             </a:pPr>
             <a:r>
-              <a:t>• Authentification : JWT (JSON Web Tokens)</a:t>
-            </a:r>
-          </a:p>
-        </p:txBody>
-      </p:sp>
+              <a:t>API REST</a:t>
+            </a:r>
+          </a:p>
+        </p:txBody>
+      </p:sp>
+      <p:sp>
+        <p:nvSpPr>
+          <p:cNvPr id="15" name="TextBox 14"/>
+          <p:cNvSpPr txBox="1"/>
+          <p:nvPr/>
+        </p:nvSpPr>
+        <p:spPr>
+          <a:xfrm>
+            <a:off x="4754880" y="3886200"/>
+            <a:ext cx="2743200" cy="365760"/>
+          </a:xfrm>
+          <a:prstGeom prst="rect">
+            <a:avLst/>
+          </a:prstGeom>
+          <a:noFill/>
+        </p:spPr>
+        <p:txBody>
+          <a:bodyPr wrap="none">
+            <a:spAutoFit/>
+          </a:bodyPr>
+          <a:lstStyle/>
+          <a:p>
+            <a:pPr algn="ctr">
+              <a:defRPr sz="1200">
+                <a:solidFill>
+                  <a:srgbClr val="FFFFFF"/>
+                </a:solidFill>
+              </a:defRPr>
+            </a:pPr>
+            <a:r>
+              <a:t>Django + DRF</a:t>
+            </a:r>
+          </a:p>
+        </p:txBody>
+      </p:sp>
+      <p:sp>
+        <p:nvSpPr>
+          <p:cNvPr id="16" name="Rounded Rectangle 15"/>
+          <p:cNvSpPr/>
+          <p:nvPr/>
+        </p:nvSpPr>
+        <p:spPr>
+          <a:xfrm>
+            <a:off x="8869680" y="2971800"/>
+            <a:ext cx="2560320" cy="1371600"/>
+          </a:xfrm>
+          <a:prstGeom prst="roundRect">
+            <a:avLst/>
+          </a:prstGeom>
+          <a:solidFill>
+            <a:srgbClr val="6366F1"/>
+          </a:solidFill>
+          <a:ln>
+            <a:noFill/>
+          </a:ln>
+        </p:spPr>
+        <p:style>
+          <a:lnRef idx="1">
+            <a:schemeClr val="accent1"/>
+          </a:lnRef>
+          <a:fillRef idx="3">
+            <a:schemeClr val="accent1"/>
+          </a:fillRef>
+          <a:effectRef idx="2">
+            <a:schemeClr val="accent1"/>
+          </a:effectRef>
+          <a:fontRef idx="minor">
+            <a:schemeClr val="lt1"/>
+          </a:fontRef>
+        </p:style>
+        <p:txBody>
+          <a:bodyPr rtlCol="0" anchor="ctr"/>
+          <a:lstStyle/>
+          <a:p>
+            <a:pPr algn="ctr"/>
+          </a:p>
+        </p:txBody>
+      </p:sp>
+      <p:sp>
+        <p:nvSpPr>
+          <p:cNvPr id="17" name="TextBox 16"/>
+          <p:cNvSpPr txBox="1"/>
+          <p:nvPr/>
+        </p:nvSpPr>
+        <p:spPr>
+          <a:xfrm>
+            <a:off x="8869680" y="3108960"/>
+            <a:ext cx="2560320" cy="457200"/>
+          </a:xfrm>
+          <a:prstGeom prst="rect">
+            <a:avLst/>
+          </a:prstGeom>
+          <a:noFill/>
+        </p:spPr>
+        <p:txBody>
+          <a:bodyPr wrap="none">
+            <a:spAutoFit/>
+          </a:bodyPr>
+          <a:lstStyle/>
+          <a:p>
+            <a:pPr algn="ctr">
+              <a:defRPr sz="2800"/>
+            </a:pPr>
+            <a:r>
+              <a:t>🗄️</a:t>
+            </a:r>
+          </a:p>
+        </p:txBody>
+      </p:sp>
+      <p:sp>
+        <p:nvSpPr>
+          <p:cNvPr id="18" name="TextBox 17"/>
+          <p:cNvSpPr txBox="1"/>
+          <p:nvPr/>
+        </p:nvSpPr>
+        <p:spPr>
+          <a:xfrm>
+            <a:off x="8869680" y="3566160"/>
+            <a:ext cx="2560320" cy="365760"/>
+          </a:xfrm>
+          <a:prstGeom prst="rect">
+            <a:avLst/>
+          </a:prstGeom>
+          <a:noFill/>
+        </p:spPr>
+        <p:txBody>
+          <a:bodyPr wrap="none">
+            <a:spAutoFit/>
+          </a:bodyPr>
+          <a:lstStyle/>
+          <a:p>
+            <a:pPr algn="ctr">
+              <a:defRPr sz="1600" b="1">
+                <a:solidFill>
+                  <a:srgbClr val="FFFFFF"/>
+                </a:solidFill>
+              </a:defRPr>
+            </a:pPr>
+            <a:r>
+              <a:t>Base de données</a:t>
+            </a:r>
+          </a:p>
+        </p:txBody>
+      </p:sp>
+      <p:sp>
+        <p:nvSpPr>
+          <p:cNvPr id="19" name="TextBox 18"/>
+          <p:cNvSpPr txBox="1"/>
+          <p:nvPr/>
+        </p:nvSpPr>
+        <p:spPr>
+          <a:xfrm>
+            <a:off x="8869680" y="3886200"/>
+            <a:ext cx="2560320" cy="365760"/>
+          </a:xfrm>
+          <a:prstGeom prst="rect">
+            <a:avLst/>
+          </a:prstGeom>
+          <a:noFill/>
+        </p:spPr>
+        <p:txBody>
+          <a:bodyPr wrap="none">
+            <a:spAutoFit/>
+          </a:bodyPr>
+          <a:lstStyle/>
+          <a:p>
+            <a:pPr algn="ctr">
+              <a:defRPr sz="1200">
+                <a:solidFill>
+                  <a:srgbClr val="FFFFFF"/>
+                </a:solidFill>
+              </a:defRPr>
+            </a:pPr>
+            <a:r>
+              <a:t>PostgreSQL</a:t>
+            </a:r>
+          </a:p>
+        </p:txBody>
+      </p:sp>
+      <p:cxnSp>
+        <p:nvCxnSpPr>
+          <p:cNvPr id="20" name="Connector 19"/>
+          <p:cNvCxnSpPr/>
+          <p:nvPr/>
+        </p:nvCxnSpPr>
+        <p:spPr>
+          <a:xfrm>
+            <a:off x="3291840" y="2514600"/>
+            <a:ext cx="1463040" cy="1143000"/>
+          </a:xfrm>
+          <a:prstGeom prst="line">
+            <a:avLst/>
+          </a:prstGeom>
+          <a:ln w="25400">
+            <a:solidFill>
+              <a:srgbClr val="808080"/>
+            </a:solidFill>
+          </a:ln>
+        </p:spPr>
+        <p:style>
+          <a:lnRef idx="2">
+            <a:schemeClr val="accent1"/>
+          </a:lnRef>
+          <a:fillRef idx="0">
+            <a:schemeClr val="accent1"/>
+          </a:fillRef>
+          <a:effectRef idx="1">
+            <a:schemeClr val="accent1"/>
+          </a:effectRef>
+          <a:fontRef idx="minor">
+            <a:schemeClr val="tx1"/>
+          </a:fontRef>
+        </p:style>
+      </p:cxnSp>
+      <p:cxnSp>
+        <p:nvCxnSpPr>
+          <p:cNvPr id="21" name="Connector 20"/>
+          <p:cNvCxnSpPr/>
+          <p:nvPr/>
+        </p:nvCxnSpPr>
+        <p:spPr>
+          <a:xfrm flipV="1">
+            <a:off x="3291840" y="3657600"/>
+            <a:ext cx="1463040" cy="1143000"/>
+          </a:xfrm>
+          <a:prstGeom prst="line">
+            <a:avLst/>
+          </a:prstGeom>
+          <a:ln w="25400">
+            <a:solidFill>
+              <a:srgbClr val="808080"/>
+            </a:solidFill>
+          </a:ln>
+        </p:spPr>
+        <p:style>
+          <a:lnRef idx="2">
+            <a:schemeClr val="accent1"/>
+          </a:lnRef>
+          <a:fillRef idx="0">
+            <a:schemeClr val="accent1"/>
+          </a:fillRef>
+          <a:effectRef idx="1">
+            <a:schemeClr val="accent1"/>
+          </a:effectRef>
+          <a:fontRef idx="minor">
+            <a:schemeClr val="tx1"/>
+          </a:fontRef>
+        </p:style>
+      </p:cxnSp>
+      <p:cxnSp>
+        <p:nvCxnSpPr>
+          <p:cNvPr id="22" name="Connector 21"/>
+          <p:cNvCxnSpPr/>
+          <p:nvPr/>
+        </p:nvCxnSpPr>
+        <p:spPr>
+          <a:xfrm>
+            <a:off x="7498079" y="3657600"/>
+            <a:ext cx="1371601" cy="0"/>
+          </a:xfrm>
+          <a:prstGeom prst="line">
+            <a:avLst/>
+          </a:prstGeom>
+          <a:ln w="25400">
+            <a:solidFill>
+              <a:srgbClr val="808080"/>
+            </a:solidFill>
+          </a:ln>
+        </p:spPr>
+        <p:style>
+          <a:lnRef idx="2">
+            <a:schemeClr val="accent1"/>
+          </a:lnRef>
+          <a:fillRef idx="0">
+            <a:schemeClr val="accent1"/>
+          </a:fillRef>
+          <a:effectRef idx="1">
+            <a:schemeClr val="accent1"/>
+          </a:effectRef>
+          <a:fontRef idx="minor">
+            <a:schemeClr val="tx1"/>
+          </a:fontRef>
+        </p:style>
+      </p:cxnSp>
     </p:spTree>
   </p:cSld>
   <p:clrMapOvr>
@@ -4066,8 +6296,39 @@
         </p:nvSpPr>
         <p:spPr>
           <a:xfrm>
-            <a:off x="457200" y="2743200"/>
-            <a:ext cx="11277295" cy="1371600"/>
+            <a:off x="457200" y="2011680"/>
+            <a:ext cx="11277295" cy="914400"/>
+          </a:xfrm>
+          <a:prstGeom prst="rect">
+            <a:avLst/>
+          </a:prstGeom>
+          <a:noFill/>
+        </p:spPr>
+        <p:txBody>
+          <a:bodyPr wrap="none">
+            <a:spAutoFit/>
+          </a:bodyPr>
+          <a:lstStyle/>
+          <a:p>
+            <a:pPr algn="ctr">
+              <a:defRPr sz="7200"/>
+            </a:pPr>
+            <a:r>
+              <a:t>🎬</a:t>
+            </a:r>
+          </a:p>
+        </p:txBody>
+      </p:sp>
+      <p:sp>
+        <p:nvSpPr>
+          <p:cNvPr id="4" name="TextBox 3"/>
+          <p:cNvSpPr txBox="1"/>
+          <p:nvPr/>
+        </p:nvSpPr>
+        <p:spPr>
+          <a:xfrm>
+            <a:off x="457200" y="3200400"/>
+            <a:ext cx="11277295" cy="914400"/>
           </a:xfrm>
           <a:prstGeom prst="rect">
             <a:avLst/>
@@ -4089,6 +6350,41 @@
             </a:pPr>
             <a:r>
               <a:t>Démonstration</a:t>
+            </a:r>
+          </a:p>
+        </p:txBody>
+      </p:sp>
+      <p:sp>
+        <p:nvSpPr>
+          <p:cNvPr id="5" name="TextBox 4"/>
+          <p:cNvSpPr txBox="1"/>
+          <p:nvPr/>
+        </p:nvSpPr>
+        <p:spPr>
+          <a:xfrm>
+            <a:off x="457200" y="4297680"/>
+            <a:ext cx="11277295" cy="548640"/>
+          </a:xfrm>
+          <a:prstGeom prst="rect">
+            <a:avLst/>
+          </a:prstGeom>
+          <a:noFill/>
+        </p:spPr>
+        <p:txBody>
+          <a:bodyPr wrap="none">
+            <a:spAutoFit/>
+          </a:bodyPr>
+          <a:lstStyle/>
+          <a:p>
+            <a:pPr algn="ctr">
+              <a:defRPr sz="2400">
+                <a:solidFill>
+                  <a:srgbClr val="FFFFFF"/>
+                </a:solidFill>
+              </a:defRPr>
+            </a:pPr>
+            <a:r>
+              <a:t>Passons à la pratique...</a:t>
             </a:r>
           </a:p>
         </p:txBody>

</xml_diff>

<commit_message>
Update presentation: fix dashboard access and remove technologies
- Slide 3: Changed "Pour Administrateurs" to "Pour Administrateurs & Agents"
- Slide 5: Removed technology names (Flutter, Django, etc.)

🤖 Generated with [Claude Code](https://claude.com/claude-code)

Co-Authored-By: Claude Opus 4.5 <noreply@anthropic.com>
</commit_message>
<xml_diff>
--- a/Djezzy_POS_Presentation.pptx
+++ b/Djezzy_POS_Presentation.pptx
@@ -4145,7 +4145,7 @@
               </a:defRPr>
             </a:pPr>
             <a:r>
-              <a:t>Pour Administrateurs</a:t>
+              <a:t>Pour Administrateurs &amp; Agents</a:t>
             </a:r>
           </a:p>
         </p:txBody>
@@ -5657,41 +5657,6 @@
       </p:sp>
       <p:sp>
         <p:nvSpPr>
-          <p:cNvPr id="7" name="TextBox 6"/>
-          <p:cNvSpPr txBox="1"/>
-          <p:nvPr/>
-        </p:nvSpPr>
-        <p:spPr>
-          <a:xfrm>
-            <a:off x="731520" y="2743200"/>
-            <a:ext cx="2560320" cy="365760"/>
-          </a:xfrm>
-          <a:prstGeom prst="rect">
-            <a:avLst/>
-          </a:prstGeom>
-          <a:noFill/>
-        </p:spPr>
-        <p:txBody>
-          <a:bodyPr wrap="none">
-            <a:spAutoFit/>
-          </a:bodyPr>
-          <a:lstStyle/>
-          <a:p>
-            <a:pPr algn="ctr">
-              <a:defRPr sz="1200">
-                <a:solidFill>
-                  <a:srgbClr val="FFFFFF"/>
-                </a:solidFill>
-              </a:defRPr>
-            </a:pPr>
-            <a:r>
-              <a:t>Flutter</a:t>
-            </a:r>
-          </a:p>
-        </p:txBody>
-      </p:sp>
-      <p:sp>
-        <p:nvSpPr>
           <p:cNvPr id="8" name="Rounded Rectangle 7"/>
           <p:cNvSpPr/>
           <p:nvPr/>
@@ -5801,41 +5766,6 @@
       </p:sp>
       <p:sp>
         <p:nvSpPr>
-          <p:cNvPr id="11" name="TextBox 10"/>
-          <p:cNvSpPr txBox="1"/>
-          <p:nvPr/>
-        </p:nvSpPr>
-        <p:spPr>
-          <a:xfrm>
-            <a:off x="731520" y="5029200"/>
-            <a:ext cx="2560320" cy="365760"/>
-          </a:xfrm>
-          <a:prstGeom prst="rect">
-            <a:avLst/>
-          </a:prstGeom>
-          <a:noFill/>
-        </p:spPr>
-        <p:txBody>
-          <a:bodyPr wrap="none">
-            <a:spAutoFit/>
-          </a:bodyPr>
-          <a:lstStyle/>
-          <a:p>
-            <a:pPr algn="ctr">
-              <a:defRPr sz="1200">
-                <a:solidFill>
-                  <a:srgbClr val="FFFFFF"/>
-                </a:solidFill>
-              </a:defRPr>
-            </a:pPr>
-            <a:r>
-              <a:t>Alpine.js + Tailwind</a:t>
-            </a:r>
-          </a:p>
-        </p:txBody>
-      </p:sp>
-      <p:sp>
-        <p:nvSpPr>
           <p:cNvPr id="12" name="Rounded Rectangle 11"/>
           <p:cNvSpPr/>
           <p:nvPr/>
@@ -5945,41 +5875,6 @@
       </p:sp>
       <p:sp>
         <p:nvSpPr>
-          <p:cNvPr id="15" name="TextBox 14"/>
-          <p:cNvSpPr txBox="1"/>
-          <p:nvPr/>
-        </p:nvSpPr>
-        <p:spPr>
-          <a:xfrm>
-            <a:off x="4754880" y="3886200"/>
-            <a:ext cx="2743200" cy="365760"/>
-          </a:xfrm>
-          <a:prstGeom prst="rect">
-            <a:avLst/>
-          </a:prstGeom>
-          <a:noFill/>
-        </p:spPr>
-        <p:txBody>
-          <a:bodyPr wrap="none">
-            <a:spAutoFit/>
-          </a:bodyPr>
-          <a:lstStyle/>
-          <a:p>
-            <a:pPr algn="ctr">
-              <a:defRPr sz="1200">
-                <a:solidFill>
-                  <a:srgbClr val="FFFFFF"/>
-                </a:solidFill>
-              </a:defRPr>
-            </a:pPr>
-            <a:r>
-              <a:t>Django + DRF</a:t>
-            </a:r>
-          </a:p>
-        </p:txBody>
-      </p:sp>
-      <p:sp>
-        <p:nvSpPr>
           <p:cNvPr id="16" name="Rounded Rectangle 15"/>
           <p:cNvSpPr/>
           <p:nvPr/>
@@ -6083,41 +5978,6 @@
             </a:pPr>
             <a:r>
               <a:t>Base de données</a:t>
-            </a:r>
-          </a:p>
-        </p:txBody>
-      </p:sp>
-      <p:sp>
-        <p:nvSpPr>
-          <p:cNvPr id="19" name="TextBox 18"/>
-          <p:cNvSpPr txBox="1"/>
-          <p:nvPr/>
-        </p:nvSpPr>
-        <p:spPr>
-          <a:xfrm>
-            <a:off x="8869680" y="3886200"/>
-            <a:ext cx="2560320" cy="365760"/>
-          </a:xfrm>
-          <a:prstGeom prst="rect">
-            <a:avLst/>
-          </a:prstGeom>
-          <a:noFill/>
-        </p:spPr>
-        <p:txBody>
-          <a:bodyPr wrap="none">
-            <a:spAutoFit/>
-          </a:bodyPr>
-          <a:lstStyle/>
-          <a:p>
-            <a:pPr algn="ctr">
-              <a:defRPr sz="1200">
-                <a:solidFill>
-                  <a:srgbClr val="FFFFFF"/>
-                </a:solidFill>
-              </a:defRPr>
-            </a:pPr>
-            <a:r>
-              <a:t>PostgreSQL</a:t>
             </a:r>
           </a:p>
         </p:txBody>

</xml_diff>

<commit_message>
Add workflow slide to presentation
- Added visual workflow diagram showing app flow
- Includes: Login -> OTP -> Offres -> Numero -> MRZ -> NFC -> Contact -> Signature -> PDF
- Highlights key technologies: MRZ Scanner, NFC (DG2/DG7/DG11/DG12), Digital Signature, QR Code

🤖 Generated with [Claude Code](https://claude.com/claude-code)

Co-Authored-By: Claude Opus 4.5 <noreply@anthropic.com>
</commit_message>
<xml_diff>
--- a/Djezzy_POS_Presentation.pptx
+++ b/Djezzy_POS_Presentation.pptx
@@ -6,6 +6,7 @@
   </p:sldMasterIdLst>
   <p:sldIdLst>
     <p:sldId id="256" r:id="rId7"/>
+    <p:sldId id="262" r:id="rId13"/>
     <p:sldId id="257" r:id="rId8"/>
     <p:sldId id="258" r:id="rId9"/>
     <p:sldId id="259" r:id="rId10"/>
@@ -6245,6 +6246,1434 @@
             </a:pPr>
             <a:r>
               <a:t>Passons à la pratique...</a:t>
+            </a:r>
+          </a:p>
+        </p:txBody>
+      </p:sp>
+    </p:spTree>
+  </p:cSld>
+  <p:clrMapOvr>
+    <a:masterClrMapping/>
+  </p:clrMapOvr>
+</p:sld>
+</file>
+
+<file path=ppt/slides/slide7.xml><?xml version="1.0" encoding="utf-8"?>
+<p:sld xmlns:a="http://schemas.openxmlformats.org/drawingml/2006/main" xmlns:p="http://schemas.openxmlformats.org/presentationml/2006/main" xmlns:r="http://schemas.openxmlformats.org/officeDocument/2006/relationships">
+  <p:cSld>
+    <p:spTree>
+      <p:nvGrpSpPr>
+        <p:cNvPr id="1" name=""/>
+        <p:cNvGrpSpPr/>
+        <p:nvPr/>
+      </p:nvGrpSpPr>
+      <p:grpSpPr/>
+      <p:sp>
+        <p:nvSpPr>
+          <p:cNvPr id="2" name="TextBox 1"/>
+          <p:cNvSpPr txBox="1"/>
+          <p:nvPr/>
+        </p:nvSpPr>
+        <p:spPr>
+          <a:xfrm>
+            <a:off x="457200" y="274320"/>
+            <a:ext cx="8229600" cy="548640"/>
+          </a:xfrm>
+          <a:prstGeom prst="rect">
+            <a:avLst/>
+          </a:prstGeom>
+          <a:noFill/>
+        </p:spPr>
+        <p:txBody>
+          <a:bodyPr wrap="none">
+            <a:spAutoFit/>
+          </a:bodyPr>
+          <a:lstStyle/>
+          <a:p>
+            <a:pPr algn="ctr">
+              <a:defRPr sz="3200" b="1">
+                <a:solidFill>
+                  <a:srgbClr val="ED1C24"/>
+                </a:solidFill>
+              </a:defRPr>
+            </a:pPr>
+            <a:r>
+              <a:t>Workflow de l'Application</a:t>
+            </a:r>
+          </a:p>
+        </p:txBody>
+      </p:sp>
+      <p:sp>
+        <p:nvSpPr>
+          <p:cNvPr id="3" name="Rounded Rectangle 2"/>
+          <p:cNvSpPr/>
+          <p:nvPr/>
+        </p:nvSpPr>
+        <p:spPr>
+          <a:xfrm>
+            <a:off x="731520" y="1188720"/>
+            <a:ext cx="1188720" cy="640080"/>
+          </a:xfrm>
+          <a:prstGeom prst="roundRect">
+            <a:avLst/>
+          </a:prstGeom>
+          <a:solidFill>
+            <a:srgbClr val="ED1C24"/>
+          </a:solidFill>
+          <a:ln w="25400">
+            <a:solidFill>
+              <a:srgbClr val="ED1C24"/>
+            </a:solidFill>
+          </a:ln>
+        </p:spPr>
+        <p:style>
+          <a:lnRef idx="1">
+            <a:schemeClr val="accent1"/>
+          </a:lnRef>
+          <a:fillRef idx="3">
+            <a:schemeClr val="accent1"/>
+          </a:fillRef>
+          <a:effectRef idx="2">
+            <a:schemeClr val="accent1"/>
+          </a:effectRef>
+          <a:fontRef idx="minor">
+            <a:schemeClr val="lt1"/>
+          </a:fontRef>
+        </p:style>
+        <p:txBody>
+          <a:bodyPr rtlCol="0" anchor="ctr" wrap="square" tIns="137160"/>
+          <a:lstStyle/>
+          <a:p>
+            <a:pPr algn="ctr">
+              <a:spcBef>
+                <a:spcPts val="0"/>
+              </a:spcBef>
+              <a:spcAft>
+                <a:spcPts val="0"/>
+              </a:spcAft>
+              <a:defRPr sz="1200" b="1">
+                <a:solidFill>
+                  <a:srgbClr val="FFFFFF"/>
+                </a:solidFill>
+              </a:defRPr>
+            </a:pPr>
+            <a:r>
+              <a:t>Login</a:t>
+            </a:r>
+          </a:p>
+        </p:txBody>
+      </p:sp>
+      <p:sp>
+        <p:nvSpPr>
+          <p:cNvPr id="4" name="Rounded Rectangle 3"/>
+          <p:cNvSpPr/>
+          <p:nvPr/>
+        </p:nvSpPr>
+        <p:spPr>
+          <a:xfrm>
+            <a:off x="2286000" y="1188720"/>
+            <a:ext cx="1188720" cy="640080"/>
+          </a:xfrm>
+          <a:prstGeom prst="roundRect">
+            <a:avLst/>
+          </a:prstGeom>
+          <a:solidFill>
+            <a:srgbClr val="ED1C24"/>
+          </a:solidFill>
+          <a:ln w="25400">
+            <a:solidFill>
+              <a:srgbClr val="ED1C24"/>
+            </a:solidFill>
+          </a:ln>
+        </p:spPr>
+        <p:style>
+          <a:lnRef idx="1">
+            <a:schemeClr val="accent1"/>
+          </a:lnRef>
+          <a:fillRef idx="3">
+            <a:schemeClr val="accent1"/>
+          </a:fillRef>
+          <a:effectRef idx="2">
+            <a:schemeClr val="accent1"/>
+          </a:effectRef>
+          <a:fontRef idx="minor">
+            <a:schemeClr val="lt1"/>
+          </a:fontRef>
+        </p:style>
+        <p:txBody>
+          <a:bodyPr rtlCol="0" anchor="ctr" wrap="square" tIns="137160"/>
+          <a:lstStyle/>
+          <a:p>
+            <a:pPr algn="ctr">
+              <a:spcBef>
+                <a:spcPts val="0"/>
+              </a:spcBef>
+              <a:spcAft>
+                <a:spcPts val="0"/>
+              </a:spcAft>
+              <a:defRPr sz="1200" b="1">
+                <a:solidFill>
+                  <a:srgbClr val="FFFFFF"/>
+                </a:solidFill>
+              </a:defRPr>
+            </a:pPr>
+            <a:r>
+              <a:t>OTP</a:t>
+            </a:r>
+          </a:p>
+        </p:txBody>
+      </p:sp>
+      <p:sp>
+        <p:nvSpPr>
+          <p:cNvPr id="5" name="Rounded Rectangle 4"/>
+          <p:cNvSpPr/>
+          <p:nvPr/>
+        </p:nvSpPr>
+        <p:spPr>
+          <a:xfrm>
+            <a:off x="3840480" y="1188720"/>
+            <a:ext cx="1188720" cy="640080"/>
+          </a:xfrm>
+          <a:prstGeom prst="roundRect">
+            <a:avLst/>
+          </a:prstGeom>
+          <a:solidFill>
+            <a:srgbClr val="ED1C24"/>
+          </a:solidFill>
+          <a:ln w="25400">
+            <a:solidFill>
+              <a:srgbClr val="ED1C24"/>
+            </a:solidFill>
+          </a:ln>
+        </p:spPr>
+        <p:style>
+          <a:lnRef idx="1">
+            <a:schemeClr val="accent1"/>
+          </a:lnRef>
+          <a:fillRef idx="3">
+            <a:schemeClr val="accent1"/>
+          </a:fillRef>
+          <a:effectRef idx="2">
+            <a:schemeClr val="accent1"/>
+          </a:effectRef>
+          <a:fontRef idx="minor">
+            <a:schemeClr val="lt1"/>
+          </a:fontRef>
+        </p:style>
+        <p:txBody>
+          <a:bodyPr rtlCol="0" anchor="ctr" wrap="square" tIns="137160"/>
+          <a:lstStyle/>
+          <a:p>
+            <a:pPr algn="ctr">
+              <a:spcBef>
+                <a:spcPts val="0"/>
+              </a:spcBef>
+              <a:spcAft>
+                <a:spcPts val="0"/>
+              </a:spcAft>
+              <a:defRPr sz="1200" b="1">
+                <a:solidFill>
+                  <a:srgbClr val="FFFFFF"/>
+                </a:solidFill>
+              </a:defRPr>
+            </a:pPr>
+            <a:r>
+              <a:t>Offres</a:t>
+            </a:r>
+          </a:p>
+        </p:txBody>
+      </p:sp>
+      <p:sp>
+        <p:nvSpPr>
+          <p:cNvPr id="6" name="Rounded Rectangle 5"/>
+          <p:cNvSpPr/>
+          <p:nvPr/>
+        </p:nvSpPr>
+        <p:spPr>
+          <a:xfrm>
+            <a:off x="5394960" y="1188720"/>
+            <a:ext cx="1188720" cy="640080"/>
+          </a:xfrm>
+          <a:prstGeom prst="roundRect">
+            <a:avLst/>
+          </a:prstGeom>
+          <a:solidFill>
+            <a:srgbClr val="ED1C24"/>
+          </a:solidFill>
+          <a:ln w="25400">
+            <a:solidFill>
+              <a:srgbClr val="ED1C24"/>
+            </a:solidFill>
+          </a:ln>
+        </p:spPr>
+        <p:style>
+          <a:lnRef idx="1">
+            <a:schemeClr val="accent1"/>
+          </a:lnRef>
+          <a:fillRef idx="3">
+            <a:schemeClr val="accent1"/>
+          </a:fillRef>
+          <a:effectRef idx="2">
+            <a:schemeClr val="accent1"/>
+          </a:effectRef>
+          <a:fontRef idx="minor">
+            <a:schemeClr val="lt1"/>
+          </a:fontRef>
+        </p:style>
+        <p:txBody>
+          <a:bodyPr rtlCol="0" anchor="ctr" wrap="square" tIns="137160"/>
+          <a:lstStyle/>
+          <a:p>
+            <a:pPr algn="ctr">
+              <a:spcBef>
+                <a:spcPts val="0"/>
+              </a:spcBef>
+              <a:spcAft>
+                <a:spcPts val="0"/>
+              </a:spcAft>
+              <a:defRPr sz="1200" b="1">
+                <a:solidFill>
+                  <a:srgbClr val="FFFFFF"/>
+                </a:solidFill>
+              </a:defRPr>
+            </a:pPr>
+            <a:r>
+              <a:t>Numero</a:t>
+            </a:r>
+          </a:p>
+        </p:txBody>
+      </p:sp>
+      <p:sp>
+        <p:nvSpPr>
+          <p:cNvPr id="7" name="Rounded Rectangle 6"/>
+          <p:cNvSpPr/>
+          <p:nvPr/>
+        </p:nvSpPr>
+        <p:spPr>
+          <a:xfrm>
+            <a:off x="731520" y="2560320"/>
+            <a:ext cx="1188720" cy="640080"/>
+          </a:xfrm>
+          <a:prstGeom prst="roundRect">
+            <a:avLst/>
+          </a:prstGeom>
+          <a:solidFill>
+            <a:srgbClr val="ED1C24"/>
+          </a:solidFill>
+          <a:ln w="25400">
+            <a:solidFill>
+              <a:srgbClr val="ED1C24"/>
+            </a:solidFill>
+          </a:ln>
+        </p:spPr>
+        <p:style>
+          <a:lnRef idx="1">
+            <a:schemeClr val="accent1"/>
+          </a:lnRef>
+          <a:fillRef idx="3">
+            <a:schemeClr val="accent1"/>
+          </a:fillRef>
+          <a:effectRef idx="2">
+            <a:schemeClr val="accent1"/>
+          </a:effectRef>
+          <a:fontRef idx="minor">
+            <a:schemeClr val="lt1"/>
+          </a:fontRef>
+        </p:style>
+        <p:txBody>
+          <a:bodyPr rtlCol="0" anchor="ctr" wrap="square" tIns="137160"/>
+          <a:lstStyle/>
+          <a:p>
+            <a:pPr algn="ctr">
+              <a:spcBef>
+                <a:spcPts val="0"/>
+              </a:spcBef>
+              <a:spcAft>
+                <a:spcPts val="0"/>
+              </a:spcAft>
+              <a:defRPr sz="1200" b="1">
+                <a:solidFill>
+                  <a:srgbClr val="FFFFFF"/>
+                </a:solidFill>
+              </a:defRPr>
+            </a:pPr>
+            <a:r>
+              <a:t>Scan MRZ</a:t>
+            </a:r>
+          </a:p>
+        </p:txBody>
+      </p:sp>
+      <p:sp>
+        <p:nvSpPr>
+          <p:cNvPr id="8" name="Rounded Rectangle 7"/>
+          <p:cNvSpPr/>
+          <p:nvPr/>
+        </p:nvSpPr>
+        <p:spPr>
+          <a:xfrm>
+            <a:off x="2286000" y="2560320"/>
+            <a:ext cx="1188720" cy="640080"/>
+          </a:xfrm>
+          <a:prstGeom prst="roundRect">
+            <a:avLst/>
+          </a:prstGeom>
+          <a:solidFill>
+            <a:srgbClr val="ED1C24"/>
+          </a:solidFill>
+          <a:ln w="25400">
+            <a:solidFill>
+              <a:srgbClr val="ED1C24"/>
+            </a:solidFill>
+          </a:ln>
+        </p:spPr>
+        <p:style>
+          <a:lnRef idx="1">
+            <a:schemeClr val="accent1"/>
+          </a:lnRef>
+          <a:fillRef idx="3">
+            <a:schemeClr val="accent1"/>
+          </a:fillRef>
+          <a:effectRef idx="2">
+            <a:schemeClr val="accent1"/>
+          </a:effectRef>
+          <a:fontRef idx="minor">
+            <a:schemeClr val="lt1"/>
+          </a:fontRef>
+        </p:style>
+        <p:txBody>
+          <a:bodyPr rtlCol="0" anchor="ctr" wrap="square" tIns="137160"/>
+          <a:lstStyle/>
+          <a:p>
+            <a:pPr algn="ctr">
+              <a:spcBef>
+                <a:spcPts val="0"/>
+              </a:spcBef>
+              <a:spcAft>
+                <a:spcPts val="0"/>
+              </a:spcAft>
+              <a:defRPr sz="1200" b="1">
+                <a:solidFill>
+                  <a:srgbClr val="FFFFFF"/>
+                </a:solidFill>
+              </a:defRPr>
+            </a:pPr>
+            <a:r>
+              <a:t>NFC Read</a:t>
+            </a:r>
+          </a:p>
+        </p:txBody>
+      </p:sp>
+      <p:sp>
+        <p:nvSpPr>
+          <p:cNvPr id="9" name="Rounded Rectangle 8"/>
+          <p:cNvSpPr/>
+          <p:nvPr/>
+        </p:nvSpPr>
+        <p:spPr>
+          <a:xfrm>
+            <a:off x="3840480" y="2560320"/>
+            <a:ext cx="1188720" cy="640080"/>
+          </a:xfrm>
+          <a:prstGeom prst="roundRect">
+            <a:avLst/>
+          </a:prstGeom>
+          <a:solidFill>
+            <a:srgbClr val="ED1C24"/>
+          </a:solidFill>
+          <a:ln w="25400">
+            <a:solidFill>
+              <a:srgbClr val="ED1C24"/>
+            </a:solidFill>
+          </a:ln>
+        </p:spPr>
+        <p:style>
+          <a:lnRef idx="1">
+            <a:schemeClr val="accent1"/>
+          </a:lnRef>
+          <a:fillRef idx="3">
+            <a:schemeClr val="accent1"/>
+          </a:fillRef>
+          <a:effectRef idx="2">
+            <a:schemeClr val="accent1"/>
+          </a:effectRef>
+          <a:fontRef idx="minor">
+            <a:schemeClr val="lt1"/>
+          </a:fontRef>
+        </p:style>
+        <p:txBody>
+          <a:bodyPr rtlCol="0" anchor="ctr" wrap="square" tIns="137160"/>
+          <a:lstStyle/>
+          <a:p>
+            <a:pPr algn="ctr">
+              <a:spcBef>
+                <a:spcPts val="0"/>
+              </a:spcBef>
+              <a:spcAft>
+                <a:spcPts val="0"/>
+              </a:spcAft>
+              <a:defRPr sz="1200" b="1">
+                <a:solidFill>
+                  <a:srgbClr val="FFFFFF"/>
+                </a:solidFill>
+              </a:defRPr>
+            </a:pPr>
+            <a:r>
+              <a:t>Contact</a:t>
+            </a:r>
+          </a:p>
+        </p:txBody>
+      </p:sp>
+      <p:sp>
+        <p:nvSpPr>
+          <p:cNvPr id="10" name="Rounded Rectangle 9"/>
+          <p:cNvSpPr/>
+          <p:nvPr/>
+        </p:nvSpPr>
+        <p:spPr>
+          <a:xfrm>
+            <a:off x="5394960" y="2560320"/>
+            <a:ext cx="1188720" cy="640080"/>
+          </a:xfrm>
+          <a:prstGeom prst="roundRect">
+            <a:avLst/>
+          </a:prstGeom>
+          <a:solidFill>
+            <a:srgbClr val="ED1C24"/>
+          </a:solidFill>
+          <a:ln w="25400">
+            <a:solidFill>
+              <a:srgbClr val="ED1C24"/>
+            </a:solidFill>
+          </a:ln>
+        </p:spPr>
+        <p:style>
+          <a:lnRef idx="1">
+            <a:schemeClr val="accent1"/>
+          </a:lnRef>
+          <a:fillRef idx="3">
+            <a:schemeClr val="accent1"/>
+          </a:fillRef>
+          <a:effectRef idx="2">
+            <a:schemeClr val="accent1"/>
+          </a:effectRef>
+          <a:fontRef idx="minor">
+            <a:schemeClr val="lt1"/>
+          </a:fontRef>
+        </p:style>
+        <p:txBody>
+          <a:bodyPr rtlCol="0" anchor="ctr" wrap="square" tIns="137160"/>
+          <a:lstStyle/>
+          <a:p>
+            <a:pPr algn="ctr">
+              <a:spcBef>
+                <a:spcPts val="0"/>
+              </a:spcBef>
+              <a:spcAft>
+                <a:spcPts val="0"/>
+              </a:spcAft>
+              <a:defRPr sz="1200" b="1">
+                <a:solidFill>
+                  <a:srgbClr val="FFFFFF"/>
+                </a:solidFill>
+              </a:defRPr>
+            </a:pPr>
+            <a:r>
+              <a:t>Signature</a:t>
+            </a:r>
+          </a:p>
+        </p:txBody>
+      </p:sp>
+      <p:sp>
+        <p:nvSpPr>
+          <p:cNvPr id="11" name="Rounded Rectangle 10"/>
+          <p:cNvSpPr/>
+          <p:nvPr/>
+        </p:nvSpPr>
+        <p:spPr>
+          <a:xfrm>
+            <a:off x="2011680" y="3931920"/>
+            <a:ext cx="3291840" cy="822960"/>
+          </a:xfrm>
+          <a:prstGeom prst="roundRect">
+            <a:avLst/>
+          </a:prstGeom>
+          <a:solidFill>
+            <a:srgbClr val="ED1C24"/>
+          </a:solidFill>
+          <a:ln w="25400">
+            <a:solidFill>
+              <a:srgbClr val="ED1C24"/>
+            </a:solidFill>
+          </a:ln>
+        </p:spPr>
+        <p:style>
+          <a:lnRef idx="1">
+            <a:schemeClr val="accent1"/>
+          </a:lnRef>
+          <a:fillRef idx="3">
+            <a:schemeClr val="accent1"/>
+          </a:fillRef>
+          <a:effectRef idx="2">
+            <a:schemeClr val="accent1"/>
+          </a:effectRef>
+          <a:fontRef idx="minor">
+            <a:schemeClr val="lt1"/>
+          </a:fontRef>
+        </p:style>
+        <p:txBody>
+          <a:bodyPr rtlCol="0" anchor="ctr" wrap="square" tIns="137160"/>
+          <a:lstStyle/>
+          <a:p>
+            <a:pPr algn="ctr">
+              <a:spcBef>
+                <a:spcPts val="0"/>
+              </a:spcBef>
+              <a:spcAft>
+                <a:spcPts val="0"/>
+              </a:spcAft>
+              <a:defRPr sz="1200" b="1">
+                <a:solidFill>
+                  <a:srgbClr val="FFFFFF"/>
+                </a:solidFill>
+              </a:defRPr>
+            </a:pPr>
+            <a:r>
+              <a:t>PDF Contract</a:t>
+            </a:r>
+            <a:br/>
+            <a:r>
+              <a:t>+ QR Code</a:t>
+            </a:r>
+          </a:p>
+        </p:txBody>
+      </p:sp>
+      <p:sp>
+        <p:nvSpPr>
+          <p:cNvPr id="12" name="Right Arrow 11"/>
+          <p:cNvSpPr/>
+          <p:nvPr/>
+        </p:nvSpPr>
+        <p:spPr>
+          <a:xfrm>
+            <a:off x="1965960" y="1417320"/>
+            <a:ext cx="274320" cy="182880"/>
+          </a:xfrm>
+          <a:prstGeom prst="rightArrow">
+            <a:avLst/>
+          </a:prstGeom>
+          <a:solidFill>
+            <a:srgbClr val="323232"/>
+          </a:solidFill>
+          <a:ln>
+            <a:noFill/>
+          </a:ln>
+        </p:spPr>
+        <p:style>
+          <a:lnRef idx="1">
+            <a:schemeClr val="accent1"/>
+          </a:lnRef>
+          <a:fillRef idx="3">
+            <a:schemeClr val="accent1"/>
+          </a:fillRef>
+          <a:effectRef idx="2">
+            <a:schemeClr val="accent1"/>
+          </a:effectRef>
+          <a:fontRef idx="minor">
+            <a:schemeClr val="lt1"/>
+          </a:fontRef>
+        </p:style>
+        <p:txBody>
+          <a:bodyPr rtlCol="0" anchor="ctr"/>
+          <a:lstStyle/>
+          <a:p>
+            <a:pPr algn="ctr"/>
+          </a:p>
+        </p:txBody>
+      </p:sp>
+      <p:sp>
+        <p:nvSpPr>
+          <p:cNvPr id="13" name="Right Arrow 12"/>
+          <p:cNvSpPr/>
+          <p:nvPr/>
+        </p:nvSpPr>
+        <p:spPr>
+          <a:xfrm>
+            <a:off x="3520440" y="1417320"/>
+            <a:ext cx="274320" cy="182880"/>
+          </a:xfrm>
+          <a:prstGeom prst="rightArrow">
+            <a:avLst/>
+          </a:prstGeom>
+          <a:solidFill>
+            <a:srgbClr val="323232"/>
+          </a:solidFill>
+          <a:ln>
+            <a:noFill/>
+          </a:ln>
+        </p:spPr>
+        <p:style>
+          <a:lnRef idx="1">
+            <a:schemeClr val="accent1"/>
+          </a:lnRef>
+          <a:fillRef idx="3">
+            <a:schemeClr val="accent1"/>
+          </a:fillRef>
+          <a:effectRef idx="2">
+            <a:schemeClr val="accent1"/>
+          </a:effectRef>
+          <a:fontRef idx="minor">
+            <a:schemeClr val="lt1"/>
+          </a:fontRef>
+        </p:style>
+        <p:txBody>
+          <a:bodyPr rtlCol="0" anchor="ctr"/>
+          <a:lstStyle/>
+          <a:p>
+            <a:pPr algn="ctr"/>
+          </a:p>
+        </p:txBody>
+      </p:sp>
+      <p:sp>
+        <p:nvSpPr>
+          <p:cNvPr id="14" name="Right Arrow 13"/>
+          <p:cNvSpPr/>
+          <p:nvPr/>
+        </p:nvSpPr>
+        <p:spPr>
+          <a:xfrm>
+            <a:off x="5074920" y="1417320"/>
+            <a:ext cx="274320" cy="182880"/>
+          </a:xfrm>
+          <a:prstGeom prst="rightArrow">
+            <a:avLst/>
+          </a:prstGeom>
+          <a:solidFill>
+            <a:srgbClr val="323232"/>
+          </a:solidFill>
+          <a:ln>
+            <a:noFill/>
+          </a:ln>
+        </p:spPr>
+        <p:style>
+          <a:lnRef idx="1">
+            <a:schemeClr val="accent1"/>
+          </a:lnRef>
+          <a:fillRef idx="3">
+            <a:schemeClr val="accent1"/>
+          </a:fillRef>
+          <a:effectRef idx="2">
+            <a:schemeClr val="accent1"/>
+          </a:effectRef>
+          <a:fontRef idx="minor">
+            <a:schemeClr val="lt1"/>
+          </a:fontRef>
+        </p:style>
+        <p:txBody>
+          <a:bodyPr rtlCol="0" anchor="ctr"/>
+          <a:lstStyle/>
+          <a:p>
+            <a:pPr algn="ctr"/>
+          </a:p>
+        </p:txBody>
+      </p:sp>
+      <p:sp>
+        <p:nvSpPr>
+          <p:cNvPr id="15" name="Right Arrow 14"/>
+          <p:cNvSpPr/>
+          <p:nvPr/>
+        </p:nvSpPr>
+        <p:spPr>
+          <a:xfrm>
+            <a:off x="1965960" y="2788920"/>
+            <a:ext cx="274320" cy="182880"/>
+          </a:xfrm>
+          <a:prstGeom prst="rightArrow">
+            <a:avLst/>
+          </a:prstGeom>
+          <a:solidFill>
+            <a:srgbClr val="323232"/>
+          </a:solidFill>
+          <a:ln>
+            <a:noFill/>
+          </a:ln>
+        </p:spPr>
+        <p:style>
+          <a:lnRef idx="1">
+            <a:schemeClr val="accent1"/>
+          </a:lnRef>
+          <a:fillRef idx="3">
+            <a:schemeClr val="accent1"/>
+          </a:fillRef>
+          <a:effectRef idx="2">
+            <a:schemeClr val="accent1"/>
+          </a:effectRef>
+          <a:fontRef idx="minor">
+            <a:schemeClr val="lt1"/>
+          </a:fontRef>
+        </p:style>
+        <p:txBody>
+          <a:bodyPr rtlCol="0" anchor="ctr"/>
+          <a:lstStyle/>
+          <a:p>
+            <a:pPr algn="ctr"/>
+          </a:p>
+        </p:txBody>
+      </p:sp>
+      <p:sp>
+        <p:nvSpPr>
+          <p:cNvPr id="16" name="Right Arrow 15"/>
+          <p:cNvSpPr/>
+          <p:nvPr/>
+        </p:nvSpPr>
+        <p:spPr>
+          <a:xfrm>
+            <a:off x="3520440" y="2788920"/>
+            <a:ext cx="274320" cy="182880"/>
+          </a:xfrm>
+          <a:prstGeom prst="rightArrow">
+            <a:avLst/>
+          </a:prstGeom>
+          <a:solidFill>
+            <a:srgbClr val="323232"/>
+          </a:solidFill>
+          <a:ln>
+            <a:noFill/>
+          </a:ln>
+        </p:spPr>
+        <p:style>
+          <a:lnRef idx="1">
+            <a:schemeClr val="accent1"/>
+          </a:lnRef>
+          <a:fillRef idx="3">
+            <a:schemeClr val="accent1"/>
+          </a:fillRef>
+          <a:effectRef idx="2">
+            <a:schemeClr val="accent1"/>
+          </a:effectRef>
+          <a:fontRef idx="minor">
+            <a:schemeClr val="lt1"/>
+          </a:fontRef>
+        </p:style>
+        <p:txBody>
+          <a:bodyPr rtlCol="0" anchor="ctr"/>
+          <a:lstStyle/>
+          <a:p>
+            <a:pPr algn="ctr"/>
+          </a:p>
+        </p:txBody>
+      </p:sp>
+      <p:sp>
+        <p:nvSpPr>
+          <p:cNvPr id="17" name="Right Arrow 16"/>
+          <p:cNvSpPr/>
+          <p:nvPr/>
+        </p:nvSpPr>
+        <p:spPr>
+          <a:xfrm>
+            <a:off x="5074920" y="2788920"/>
+            <a:ext cx="274320" cy="182880"/>
+          </a:xfrm>
+          <a:prstGeom prst="rightArrow">
+            <a:avLst/>
+          </a:prstGeom>
+          <a:solidFill>
+            <a:srgbClr val="323232"/>
+          </a:solidFill>
+          <a:ln>
+            <a:noFill/>
+          </a:ln>
+        </p:spPr>
+        <p:style>
+          <a:lnRef idx="1">
+            <a:schemeClr val="accent1"/>
+          </a:lnRef>
+          <a:fillRef idx="3">
+            <a:schemeClr val="accent1"/>
+          </a:fillRef>
+          <a:effectRef idx="2">
+            <a:schemeClr val="accent1"/>
+          </a:effectRef>
+          <a:fontRef idx="minor">
+            <a:schemeClr val="lt1"/>
+          </a:fontRef>
+        </p:style>
+        <p:txBody>
+          <a:bodyPr rtlCol="0" anchor="ctr"/>
+          <a:lstStyle/>
+          <a:p>
+            <a:pPr algn="ctr"/>
+          </a:p>
+        </p:txBody>
+      </p:sp>
+      <p:sp>
+        <p:nvSpPr>
+          <p:cNvPr id="18" name="Down Arrow 17"/>
+          <p:cNvSpPr/>
+          <p:nvPr/>
+        </p:nvSpPr>
+        <p:spPr>
+          <a:xfrm>
+            <a:off x="5897880" y="1920240"/>
+            <a:ext cx="182880" cy="548640"/>
+          </a:xfrm>
+          <a:prstGeom prst="downArrow">
+            <a:avLst/>
+          </a:prstGeom>
+          <a:solidFill>
+            <a:srgbClr val="323232"/>
+          </a:solidFill>
+          <a:ln>
+            <a:noFill/>
+          </a:ln>
+        </p:spPr>
+        <p:style>
+          <a:lnRef idx="1">
+            <a:schemeClr val="accent1"/>
+          </a:lnRef>
+          <a:fillRef idx="3">
+            <a:schemeClr val="accent1"/>
+          </a:fillRef>
+          <a:effectRef idx="2">
+            <a:schemeClr val="accent1"/>
+          </a:effectRef>
+          <a:fontRef idx="minor">
+            <a:schemeClr val="lt1"/>
+          </a:fontRef>
+        </p:style>
+        <p:txBody>
+          <a:bodyPr rtlCol="0" anchor="ctr"/>
+          <a:lstStyle/>
+          <a:p>
+            <a:pPr algn="ctr"/>
+          </a:p>
+        </p:txBody>
+      </p:sp>
+      <p:sp>
+        <p:nvSpPr>
+          <p:cNvPr id="19" name="Down Arrow 18"/>
+          <p:cNvSpPr/>
+          <p:nvPr/>
+        </p:nvSpPr>
+        <p:spPr>
+          <a:xfrm>
+            <a:off x="5897880" y="3291840"/>
+            <a:ext cx="182880" cy="548640"/>
+          </a:xfrm>
+          <a:prstGeom prst="downArrow">
+            <a:avLst/>
+          </a:prstGeom>
+          <a:solidFill>
+            <a:srgbClr val="323232"/>
+          </a:solidFill>
+          <a:ln>
+            <a:noFill/>
+          </a:ln>
+        </p:spPr>
+        <p:style>
+          <a:lnRef idx="1">
+            <a:schemeClr val="accent1"/>
+          </a:lnRef>
+          <a:fillRef idx="3">
+            <a:schemeClr val="accent1"/>
+          </a:fillRef>
+          <a:effectRef idx="2">
+            <a:schemeClr val="accent1"/>
+          </a:effectRef>
+          <a:fontRef idx="minor">
+            <a:schemeClr val="lt1"/>
+          </a:fontRef>
+        </p:style>
+        <p:txBody>
+          <a:bodyPr rtlCol="0" anchor="ctr"/>
+          <a:lstStyle/>
+          <a:p>
+            <a:pPr algn="ctr"/>
+          </a:p>
+        </p:txBody>
+      </p:sp>
+      <p:sp>
+        <p:nvSpPr>
+          <p:cNvPr id="20" name="TextBox 19"/>
+          <p:cNvSpPr txBox="1"/>
+          <p:nvPr/>
+        </p:nvSpPr>
+        <p:spPr>
+          <a:xfrm>
+            <a:off x="457200" y="5029200"/>
+            <a:ext cx="8229600" cy="365760"/>
+          </a:xfrm>
+          <a:prstGeom prst="rect">
+            <a:avLst/>
+          </a:prstGeom>
+          <a:noFill/>
+        </p:spPr>
+        <p:txBody>
+          <a:bodyPr wrap="none">
+            <a:spAutoFit/>
+          </a:bodyPr>
+          <a:lstStyle/>
+          <a:p>
+            <a:pPr>
+              <a:defRPr sz="1800" b="1">
+                <a:solidFill>
+                  <a:srgbClr val="323232"/>
+                </a:solidFill>
+              </a:defRPr>
+            </a:pPr>
+            <a:r>
+              <a:t>Technologies Cles</a:t>
+            </a:r>
+          </a:p>
+        </p:txBody>
+      </p:sp>
+      <p:sp>
+        <p:nvSpPr>
+          <p:cNvPr id="21" name="Oval 20"/>
+          <p:cNvSpPr/>
+          <p:nvPr/>
+        </p:nvSpPr>
+        <p:spPr>
+          <a:xfrm>
+            <a:off x="457200" y="5486400"/>
+            <a:ext cx="320040" cy="320040"/>
+          </a:xfrm>
+          <a:prstGeom prst="ellipse">
+            <a:avLst/>
+          </a:prstGeom>
+          <a:solidFill>
+            <a:srgbClr val="ED1C24"/>
+          </a:solidFill>
+          <a:ln>
+            <a:noFill/>
+          </a:ln>
+        </p:spPr>
+        <p:style>
+          <a:lnRef idx="1">
+            <a:schemeClr val="accent1"/>
+          </a:lnRef>
+          <a:fillRef idx="3">
+            <a:schemeClr val="accent1"/>
+          </a:fillRef>
+          <a:effectRef idx="2">
+            <a:schemeClr val="accent1"/>
+          </a:effectRef>
+          <a:fontRef idx="minor">
+            <a:schemeClr val="lt1"/>
+          </a:fontRef>
+        </p:style>
+        <p:txBody>
+          <a:bodyPr rtlCol="0" anchor="ctr"/>
+          <a:lstStyle/>
+          <a:p>
+            <a:pPr algn="ctr"/>
+          </a:p>
+        </p:txBody>
+      </p:sp>
+      <p:sp>
+        <p:nvSpPr>
+          <p:cNvPr id="22" name="TextBox 21"/>
+          <p:cNvSpPr txBox="1"/>
+          <p:nvPr/>
+        </p:nvSpPr>
+        <p:spPr>
+          <a:xfrm>
+            <a:off x="868680" y="5440680"/>
+            <a:ext cx="1645920" cy="274320"/>
+          </a:xfrm>
+          <a:prstGeom prst="rect">
+            <a:avLst/>
+          </a:prstGeom>
+          <a:noFill/>
+        </p:spPr>
+        <p:txBody>
+          <a:bodyPr wrap="none">
+            <a:spAutoFit/>
+          </a:bodyPr>
+          <a:lstStyle/>
+          <a:p>
+            <a:pPr>
+              <a:defRPr sz="1100" b="1">
+                <a:solidFill>
+                  <a:srgbClr val="323232"/>
+                </a:solidFill>
+              </a:defRPr>
+            </a:pPr>
+            <a:r>
+              <a:t>MRZ Scanner</a:t>
+            </a:r>
+          </a:p>
+        </p:txBody>
+      </p:sp>
+      <p:sp>
+        <p:nvSpPr>
+          <p:cNvPr id="23" name="TextBox 22"/>
+          <p:cNvSpPr txBox="1"/>
+          <p:nvPr/>
+        </p:nvSpPr>
+        <p:spPr>
+          <a:xfrm>
+            <a:off x="868680" y="5669280"/>
+            <a:ext cx="1645920" cy="274320"/>
+          </a:xfrm>
+          <a:prstGeom prst="rect">
+            <a:avLst/>
+          </a:prstGeom>
+          <a:noFill/>
+        </p:spPr>
+        <p:txBody>
+          <a:bodyPr wrap="none">
+            <a:spAutoFit/>
+          </a:bodyPr>
+          <a:lstStyle/>
+          <a:p>
+            <a:pPr>
+              <a:defRPr sz="900">
+                <a:solidFill>
+                  <a:srgbClr val="646464"/>
+                </a:solidFill>
+              </a:defRPr>
+            </a:pPr>
+            <a:r>
+              <a:t>Camera + ML Kit</a:t>
+            </a:r>
+          </a:p>
+        </p:txBody>
+      </p:sp>
+      <p:sp>
+        <p:nvSpPr>
+          <p:cNvPr id="24" name="Oval 23"/>
+          <p:cNvSpPr/>
+          <p:nvPr/>
+        </p:nvSpPr>
+        <p:spPr>
+          <a:xfrm>
+            <a:off x="2286000" y="5486400"/>
+            <a:ext cx="320040" cy="320040"/>
+          </a:xfrm>
+          <a:prstGeom prst="ellipse">
+            <a:avLst/>
+          </a:prstGeom>
+          <a:solidFill>
+            <a:srgbClr val="ED1C24"/>
+          </a:solidFill>
+          <a:ln>
+            <a:noFill/>
+          </a:ln>
+        </p:spPr>
+        <p:style>
+          <a:lnRef idx="1">
+            <a:schemeClr val="accent1"/>
+          </a:lnRef>
+          <a:fillRef idx="3">
+            <a:schemeClr val="accent1"/>
+          </a:fillRef>
+          <a:effectRef idx="2">
+            <a:schemeClr val="accent1"/>
+          </a:effectRef>
+          <a:fontRef idx="minor">
+            <a:schemeClr val="lt1"/>
+          </a:fontRef>
+        </p:style>
+        <p:txBody>
+          <a:bodyPr rtlCol="0" anchor="ctr"/>
+          <a:lstStyle/>
+          <a:p>
+            <a:pPr algn="ctr"/>
+          </a:p>
+        </p:txBody>
+      </p:sp>
+      <p:sp>
+        <p:nvSpPr>
+          <p:cNvPr id="25" name="TextBox 24"/>
+          <p:cNvSpPr txBox="1"/>
+          <p:nvPr/>
+        </p:nvSpPr>
+        <p:spPr>
+          <a:xfrm>
+            <a:off x="2697480" y="5440680"/>
+            <a:ext cx="1645920" cy="274320"/>
+          </a:xfrm>
+          <a:prstGeom prst="rect">
+            <a:avLst/>
+          </a:prstGeom>
+          <a:noFill/>
+        </p:spPr>
+        <p:txBody>
+          <a:bodyPr wrap="none">
+            <a:spAutoFit/>
+          </a:bodyPr>
+          <a:lstStyle/>
+          <a:p>
+            <a:pPr>
+              <a:defRPr sz="1100" b="1">
+                <a:solidFill>
+                  <a:srgbClr val="323232"/>
+                </a:solidFill>
+              </a:defRPr>
+            </a:pPr>
+            <a:r>
+              <a:t>NFC</a:t>
+            </a:r>
+          </a:p>
+        </p:txBody>
+      </p:sp>
+      <p:sp>
+        <p:nvSpPr>
+          <p:cNvPr id="26" name="TextBox 25"/>
+          <p:cNvSpPr txBox="1"/>
+          <p:nvPr/>
+        </p:nvSpPr>
+        <p:spPr>
+          <a:xfrm>
+            <a:off x="2697480" y="5669280"/>
+            <a:ext cx="1645920" cy="274320"/>
+          </a:xfrm>
+          <a:prstGeom prst="rect">
+            <a:avLst/>
+          </a:prstGeom>
+          <a:noFill/>
+        </p:spPr>
+        <p:txBody>
+          <a:bodyPr wrap="none">
+            <a:spAutoFit/>
+          </a:bodyPr>
+          <a:lstStyle/>
+          <a:p>
+            <a:pPr>
+              <a:defRPr sz="900">
+                <a:solidFill>
+                  <a:srgbClr val="646464"/>
+                </a:solidFill>
+              </a:defRPr>
+            </a:pPr>
+            <a:r>
+              <a:t>DG2, DG7, DG11, DG12</a:t>
+            </a:r>
+          </a:p>
+        </p:txBody>
+      </p:sp>
+      <p:sp>
+        <p:nvSpPr>
+          <p:cNvPr id="27" name="Oval 26"/>
+          <p:cNvSpPr/>
+          <p:nvPr/>
+        </p:nvSpPr>
+        <p:spPr>
+          <a:xfrm>
+            <a:off x="4389120" y="5486400"/>
+            <a:ext cx="320040" cy="320040"/>
+          </a:xfrm>
+          <a:prstGeom prst="ellipse">
+            <a:avLst/>
+          </a:prstGeom>
+          <a:solidFill>
+            <a:srgbClr val="ED1C24"/>
+          </a:solidFill>
+          <a:ln>
+            <a:noFill/>
+          </a:ln>
+        </p:spPr>
+        <p:style>
+          <a:lnRef idx="1">
+            <a:schemeClr val="accent1"/>
+          </a:lnRef>
+          <a:fillRef idx="3">
+            <a:schemeClr val="accent1"/>
+          </a:fillRef>
+          <a:effectRef idx="2">
+            <a:schemeClr val="accent1"/>
+          </a:effectRef>
+          <a:fontRef idx="minor">
+            <a:schemeClr val="lt1"/>
+          </a:fontRef>
+        </p:style>
+        <p:txBody>
+          <a:bodyPr rtlCol="0" anchor="ctr"/>
+          <a:lstStyle/>
+          <a:p>
+            <a:pPr algn="ctr"/>
+          </a:p>
+        </p:txBody>
+      </p:sp>
+      <p:sp>
+        <p:nvSpPr>
+          <p:cNvPr id="28" name="TextBox 27"/>
+          <p:cNvSpPr txBox="1"/>
+          <p:nvPr/>
+        </p:nvSpPr>
+        <p:spPr>
+          <a:xfrm>
+            <a:off x="4800600" y="5440680"/>
+            <a:ext cx="1645920" cy="274320"/>
+          </a:xfrm>
+          <a:prstGeom prst="rect">
+            <a:avLst/>
+          </a:prstGeom>
+          <a:noFill/>
+        </p:spPr>
+        <p:txBody>
+          <a:bodyPr wrap="none">
+            <a:spAutoFit/>
+          </a:bodyPr>
+          <a:lstStyle/>
+          <a:p>
+            <a:pPr>
+              <a:defRPr sz="1100" b="1">
+                <a:solidFill>
+                  <a:srgbClr val="323232"/>
+                </a:solidFill>
+              </a:defRPr>
+            </a:pPr>
+            <a:r>
+              <a:t>Signature</a:t>
+            </a:r>
+          </a:p>
+        </p:txBody>
+      </p:sp>
+      <p:sp>
+        <p:nvSpPr>
+          <p:cNvPr id="29" name="TextBox 28"/>
+          <p:cNvSpPr txBox="1"/>
+          <p:nvPr/>
+        </p:nvSpPr>
+        <p:spPr>
+          <a:xfrm>
+            <a:off x="4800600" y="5669280"/>
+            <a:ext cx="1645920" cy="274320"/>
+          </a:xfrm>
+          <a:prstGeom prst="rect">
+            <a:avLst/>
+          </a:prstGeom>
+          <a:noFill/>
+        </p:spPr>
+        <p:txBody>
+          <a:bodyPr wrap="none">
+            <a:spAutoFit/>
+          </a:bodyPr>
+          <a:lstStyle/>
+          <a:p>
+            <a:pPr>
+              <a:defRPr sz="900">
+                <a:solidFill>
+                  <a:srgbClr val="646464"/>
+                </a:solidFill>
+              </a:defRPr>
+            </a:pPr>
+            <a:r>
+              <a:t>Canvas numerique</a:t>
+            </a:r>
+          </a:p>
+        </p:txBody>
+      </p:sp>
+      <p:sp>
+        <p:nvSpPr>
+          <p:cNvPr id="30" name="Oval 29"/>
+          <p:cNvSpPr/>
+          <p:nvPr/>
+        </p:nvSpPr>
+        <p:spPr>
+          <a:xfrm>
+            <a:off x="6400800" y="5486400"/>
+            <a:ext cx="320040" cy="320040"/>
+          </a:xfrm>
+          <a:prstGeom prst="ellipse">
+            <a:avLst/>
+          </a:prstGeom>
+          <a:solidFill>
+            <a:srgbClr val="ED1C24"/>
+          </a:solidFill>
+          <a:ln>
+            <a:noFill/>
+          </a:ln>
+        </p:spPr>
+        <p:style>
+          <a:lnRef idx="1">
+            <a:schemeClr val="accent1"/>
+          </a:lnRef>
+          <a:fillRef idx="3">
+            <a:schemeClr val="accent1"/>
+          </a:fillRef>
+          <a:effectRef idx="2">
+            <a:schemeClr val="accent1"/>
+          </a:effectRef>
+          <a:fontRef idx="minor">
+            <a:schemeClr val="lt1"/>
+          </a:fontRef>
+        </p:style>
+        <p:txBody>
+          <a:bodyPr rtlCol="0" anchor="ctr"/>
+          <a:lstStyle/>
+          <a:p>
+            <a:pPr algn="ctr"/>
+          </a:p>
+        </p:txBody>
+      </p:sp>
+      <p:sp>
+        <p:nvSpPr>
+          <p:cNvPr id="31" name="TextBox 30"/>
+          <p:cNvSpPr txBox="1"/>
+          <p:nvPr/>
+        </p:nvSpPr>
+        <p:spPr>
+          <a:xfrm>
+            <a:off x="6812280" y="5440680"/>
+            <a:ext cx="1645920" cy="274320"/>
+          </a:xfrm>
+          <a:prstGeom prst="rect">
+            <a:avLst/>
+          </a:prstGeom>
+          <a:noFill/>
+        </p:spPr>
+        <p:txBody>
+          <a:bodyPr wrap="none">
+            <a:spAutoFit/>
+          </a:bodyPr>
+          <a:lstStyle/>
+          <a:p>
+            <a:pPr>
+              <a:defRPr sz="1100" b="1">
+                <a:solidFill>
+                  <a:srgbClr val="323232"/>
+                </a:solidFill>
+              </a:defRPr>
+            </a:pPr>
+            <a:r>
+              <a:t>QR Code</a:t>
+            </a:r>
+          </a:p>
+        </p:txBody>
+      </p:sp>
+      <p:sp>
+        <p:nvSpPr>
+          <p:cNvPr id="32" name="TextBox 31"/>
+          <p:cNvSpPr txBox="1"/>
+          <p:nvPr/>
+        </p:nvSpPr>
+        <p:spPr>
+          <a:xfrm>
+            <a:off x="6812280" y="5669280"/>
+            <a:ext cx="1645920" cy="274320"/>
+          </a:xfrm>
+          <a:prstGeom prst="rect">
+            <a:avLst/>
+          </a:prstGeom>
+          <a:noFill/>
+        </p:spPr>
+        <p:txBody>
+          <a:bodyPr wrap="none">
+            <a:spAutoFit/>
+          </a:bodyPr>
+          <a:lstStyle/>
+          <a:p>
+            <a:pPr>
+              <a:defRPr sz="900">
+                <a:solidFill>
+                  <a:srgbClr val="646464"/>
+                </a:solidFill>
+              </a:defRPr>
+            </a:pPr>
+            <a:r>
+              <a:t>Verification contrat</a:t>
             </a:r>
           </a:p>
         </p:txBody>

</xml_diff>